<commit_message>
Massive updates after using this stuff for a year
</commit_message>
<xml_diff>
--- a/Programming with C#/3. C# Object-Oriented Programming/08. OOP Practical Workshop - Academy Popcorn/Academy-Popcorn.pptx
+++ b/Programming with C#/3. C# Object-Oriented Programming/08. OOP Practical Workshop - Academy Popcorn/Academy-Popcorn.pptx
@@ -317,7 +317,7 @@
             <a:fld id="{3BF7C7B5-275F-4D1F-9AB4-9255447DBC73}" type="datetimeFigureOut">
               <a:rPr lang="en-US"/>
               <a:pPr/>
-              <a:t>10/27/2013</a:t>
+              <a:t>12/1/2019</a:t>
             </a:fld>
             <a:endParaRPr lang="en-US" dirty="0"/>
           </a:p>
@@ -548,7 +548,7 @@
             <a:fld id="{9B46F231-FB2B-4655-A644-E2477325E686}" type="datetimeFigureOut">
               <a:rPr lang="en-US"/>
               <a:pPr/>
-              <a:t>10/27/2013</a:t>
+              <a:t>12/1/2019</a:t>
             </a:fld>
             <a:endParaRPr lang="en-US" dirty="0"/>
           </a:p>
@@ -624,38 +624,37 @@
           <a:p>
             <a:pPr lvl="0"/>
             <a:r>
-              <a:rPr lang="en-US" noProof="0" smtClean="0"/>
+              <a:rPr lang="en-US" noProof="0"/>
               <a:t>Click to edit Master text styles</a:t>
             </a:r>
           </a:p>
           <a:p>
             <a:pPr lvl="1"/>
             <a:r>
-              <a:rPr lang="en-US" noProof="0" smtClean="0"/>
+              <a:rPr lang="en-US" noProof="0"/>
               <a:t>Second level</a:t>
             </a:r>
           </a:p>
           <a:p>
             <a:pPr lvl="2"/>
             <a:r>
-              <a:rPr lang="en-US" noProof="0" smtClean="0"/>
+              <a:rPr lang="en-US" noProof="0"/>
               <a:t>Third level</a:t>
             </a:r>
           </a:p>
           <a:p>
             <a:pPr lvl="3"/>
             <a:r>
-              <a:rPr lang="en-US" noProof="0" smtClean="0"/>
+              <a:rPr lang="en-US" noProof="0"/>
               <a:t>Fourth level</a:t>
             </a:r>
           </a:p>
           <a:p>
             <a:pPr lvl="4"/>
             <a:r>
-              <a:rPr lang="en-US" noProof="0" smtClean="0"/>
+              <a:rPr lang="en-US" noProof="0"/>
               <a:t>Fifth level</a:t>
             </a:r>
-            <a:endParaRPr lang="en-US" noProof="0"/>
           </a:p>
         </p:txBody>
       </p:sp>
@@ -1134,7 +1133,7 @@
           <a:lstStyle/>
           <a:p>
             <a:pPr eaLnBrk="1" hangingPunct="1"/>
-            <a:endParaRPr lang="bg-BG" smtClean="0"/>
+            <a:endParaRPr lang="bg-BG"/>
           </a:p>
         </p:txBody>
       </p:sp>
@@ -1394,7 +1393,7 @@
           <a:lstStyle/>
           <a:p>
             <a:pPr eaLnBrk="1" hangingPunct="1"/>
-            <a:endParaRPr lang="bg-BG" smtClean="0"/>
+            <a:endParaRPr lang="bg-BG"/>
           </a:p>
         </p:txBody>
       </p:sp>
@@ -1654,7 +1653,7 @@
           <a:lstStyle/>
           <a:p>
             <a:pPr eaLnBrk="1" hangingPunct="1"/>
-            <a:endParaRPr lang="bg-BG" smtClean="0"/>
+            <a:endParaRPr lang="bg-BG"/>
           </a:p>
         </p:txBody>
       </p:sp>
@@ -1914,7 +1913,7 @@
           <a:lstStyle/>
           <a:p>
             <a:pPr eaLnBrk="1" hangingPunct="1"/>
-            <a:endParaRPr lang="bg-BG" smtClean="0"/>
+            <a:endParaRPr lang="bg-BG"/>
           </a:p>
         </p:txBody>
       </p:sp>
@@ -2174,7 +2173,7 @@
           <a:lstStyle/>
           <a:p>
             <a:pPr eaLnBrk="1" hangingPunct="1"/>
-            <a:endParaRPr lang="bg-BG" smtClean="0"/>
+            <a:endParaRPr lang="bg-BG"/>
           </a:p>
         </p:txBody>
       </p:sp>
@@ -2434,7 +2433,7 @@
           <a:lstStyle/>
           <a:p>
             <a:pPr eaLnBrk="1" hangingPunct="1"/>
-            <a:endParaRPr lang="bg-BG" smtClean="0"/>
+            <a:endParaRPr lang="bg-BG"/>
           </a:p>
         </p:txBody>
       </p:sp>
@@ -2694,7 +2693,7 @@
           <a:lstStyle/>
           <a:p>
             <a:pPr eaLnBrk="1" hangingPunct="1"/>
-            <a:endParaRPr lang="bg-BG" smtClean="0"/>
+            <a:endParaRPr lang="bg-BG"/>
           </a:p>
         </p:txBody>
       </p:sp>
@@ -2954,7 +2953,7 @@
           <a:lstStyle/>
           <a:p>
             <a:pPr eaLnBrk="1" hangingPunct="1"/>
-            <a:endParaRPr lang="bg-BG" smtClean="0"/>
+            <a:endParaRPr lang="bg-BG"/>
           </a:p>
         </p:txBody>
       </p:sp>
@@ -3033,10 +3032,9 @@
           </a:lstStyle>
           <a:p>
             <a:r>
-              <a:rPr lang="en-US" dirty="0" smtClean="0"/>
+              <a:rPr lang="en-US" dirty="0"/>
               <a:t>Presentation Title</a:t>
             </a:r>
-            <a:endParaRPr lang="en-US" dirty="0"/>
           </a:p>
         </p:txBody>
       </p:sp>
@@ -3097,10 +3095,9 @@
           </a:lstStyle>
           <a:p>
             <a:r>
-              <a:rPr lang="en-US" dirty="0" smtClean="0"/>
+              <a:rPr lang="en-US" dirty="0"/>
               <a:t>Presentation Subtitle</a:t>
             </a:r>
-            <a:endParaRPr lang="en-US" dirty="0"/>
           </a:p>
         </p:txBody>
       </p:sp>
@@ -3203,10 +3200,9 @@
           <a:p>
             <a:pPr lvl="0"/>
             <a:r>
-              <a:rPr lang="en-US" dirty="0" smtClean="0"/>
+              <a:rPr lang="en-US" dirty="0"/>
               <a:t>Author Name</a:t>
             </a:r>
-            <a:endParaRPr lang="en-US" dirty="0"/>
           </a:p>
         </p:txBody>
       </p:sp>
@@ -3282,7 +3278,7 @@
               <a:buNone/>
             </a:pPr>
             <a:r>
-              <a:rPr lang="en-US" sz="1800" b="1" dirty="0" smtClean="0">
+              <a:rPr lang="en-US" sz="1800" b="1" dirty="0">
                 <a:solidFill>
                   <a:srgbClr val="0EFE58"/>
                 </a:solidFill>
@@ -3296,18 +3292,6 @@
               </a:rPr>
               <a:t>Company Name</a:t>
             </a:r>
-            <a:endParaRPr lang="en-US" sz="1800" b="1" dirty="0">
-              <a:solidFill>
-                <a:srgbClr val="0EFE58"/>
-              </a:solidFill>
-              <a:effectLst>
-                <a:outerShdw blurRad="38100" dist="38100" dir="2700000" algn="tl">
-                  <a:srgbClr val="000000">
-                    <a:alpha val="43137"/>
-                  </a:srgbClr>
-                </a:outerShdw>
-              </a:effectLst>
-            </a:endParaRPr>
           </a:p>
         </p:txBody>
       </p:sp>
@@ -3364,7 +3348,7 @@
           <a:p>
             <a:pPr algn="l"/>
             <a:r>
-              <a:rPr lang="en-US" sz="1600" b="1" dirty="0" smtClean="0">
+              <a:rPr lang="en-US" sz="1600" b="1" dirty="0">
                 <a:solidFill>
                   <a:schemeClr val="tx1">
                     <a:lumMod val="50000"/>
@@ -3380,20 +3364,6 @@
               </a:rPr>
               <a:t>Company Web Site</a:t>
             </a:r>
-            <a:endParaRPr lang="en-US" sz="1600" b="1" dirty="0">
-              <a:solidFill>
-                <a:schemeClr val="tx1">
-                  <a:lumMod val="50000"/>
-                </a:schemeClr>
-              </a:solidFill>
-              <a:effectLst>
-                <a:outerShdw blurRad="38100" dist="38100" dir="2700000" algn="tl">
-                  <a:srgbClr val="000000">
-                    <a:alpha val="43137"/>
-                  </a:srgbClr>
-                </a:outerShdw>
-              </a:effectLst>
-            </a:endParaRPr>
           </a:p>
         </p:txBody>
       </p:sp>
@@ -3452,10 +3422,9 @@
           <a:p>
             <a:pPr lvl="0"/>
             <a:r>
-              <a:rPr lang="en-US" dirty="0" smtClean="0"/>
+              <a:rPr lang="en-US" dirty="0"/>
               <a:t>Position</a:t>
             </a:r>
-            <a:endParaRPr lang="en-US" dirty="0"/>
           </a:p>
         </p:txBody>
       </p:sp>
@@ -3514,7 +3483,7 @@
           <a:p>
             <a:pPr lvl="0"/>
             <a:r>
-              <a:rPr lang="en-US" smtClean="0"/>
+              <a:rPr lang="en-US"/>
               <a:t>Web Site</a:t>
             </a:r>
             <a:endParaRPr lang="en-US" dirty="0"/>
@@ -3550,10 +3519,9 @@
           </a:lstStyle>
           <a:p>
             <a:r>
-              <a:rPr lang="en-US" dirty="0" smtClean="0"/>
+              <a:rPr lang="en-US" dirty="0"/>
               <a:t>Insert a Picture Here</a:t>
             </a:r>
-            <a:endParaRPr lang="en-US" dirty="0"/>
           </a:p>
         </p:txBody>
       </p:sp>
@@ -3562,13 +3530,6 @@
   <p:clrMapOvr>
     <a:masterClrMapping/>
   </p:clrMapOvr>
-  <p:timing>
-    <p:tnLst>
-      <p:par>
-        <p:cTn id="1" dur="indefinite" restart="never" nodeType="tmRoot"/>
-      </p:par>
-    </p:tnLst>
-  </p:timing>
 </p:sldLayout>
 </file>
 
@@ -3646,10 +3607,9 @@
           </a:lstStyle>
           <a:p>
             <a:r>
-              <a:rPr lang="en-US" dirty="0" smtClean="0"/>
+              <a:rPr lang="en-US" dirty="0"/>
               <a:t>Slide Title</a:t>
             </a:r>
-            <a:endParaRPr lang="en-US" dirty="0"/>
           </a:p>
         </p:txBody>
       </p:sp>
@@ -3786,38 +3746,37 @@
           <a:p>
             <a:pPr lvl="0"/>
             <a:r>
-              <a:rPr lang="en-US" dirty="0" smtClean="0"/>
+              <a:rPr lang="en-US" dirty="0"/>
               <a:t>First Level</a:t>
             </a:r>
           </a:p>
           <a:p>
             <a:pPr lvl="1"/>
             <a:r>
-              <a:rPr lang="en-US" dirty="0" smtClean="0"/>
+              <a:rPr lang="en-US" dirty="0"/>
               <a:t>Second level</a:t>
             </a:r>
           </a:p>
           <a:p>
             <a:pPr lvl="2"/>
             <a:r>
-              <a:rPr lang="en-US" dirty="0" smtClean="0"/>
+              <a:rPr lang="en-US" dirty="0"/>
               <a:t>Third level</a:t>
             </a:r>
           </a:p>
           <a:p>
             <a:pPr lvl="3"/>
             <a:r>
-              <a:rPr lang="en-US" dirty="0" smtClean="0"/>
+              <a:rPr lang="en-US" dirty="0"/>
               <a:t>Fourth level</a:t>
             </a:r>
           </a:p>
           <a:p>
             <a:pPr lvl="4"/>
             <a:r>
-              <a:rPr lang="en-US" dirty="0" smtClean="0"/>
+              <a:rPr lang="en-US" dirty="0"/>
               <a:t>Fifth level</a:t>
             </a:r>
-            <a:endParaRPr lang="en-US" dirty="0"/>
           </a:p>
         </p:txBody>
       </p:sp>
@@ -3867,13 +3826,6 @@
   <p:clrMapOvr>
     <a:masterClrMapping/>
   </p:clrMapOvr>
-  <p:timing>
-    <p:tnLst>
-      <p:par>
-        <p:cTn id="1" dur="indefinite" restart="never" nodeType="tmRoot"/>
-      </p:par>
-    </p:tnLst>
-  </p:timing>
 </p:sldLayout>
 </file>
 
@@ -3936,10 +3888,9 @@
           </a:lstStyle>
           <a:p>
             <a:r>
-              <a:rPr lang="en-US" dirty="0" smtClean="0"/>
+              <a:rPr lang="en-US" dirty="0"/>
               <a:t>Slide Title</a:t>
             </a:r>
-            <a:endParaRPr lang="en-US" dirty="0"/>
           </a:p>
         </p:txBody>
       </p:sp>
@@ -4106,7 +4057,7 @@
               <a:defRPr/>
             </a:pPr>
             <a:r>
-              <a:rPr kumimoji="0" lang="en-US" sz="3200" b="1" i="0" u="none" strike="noStrike" kern="1200" cap="none" spc="0" normalizeH="0" baseline="0" noProof="0" dirty="0" smtClean="0">
+              <a:rPr kumimoji="0" lang="en-US" sz="3200" b="1" i="0" u="none" strike="noStrike" kern="1200" cap="none" spc="0" normalizeH="0" baseline="0" noProof="0" dirty="0">
                 <a:ln>
                   <a:noFill/>
                 </a:ln>
@@ -4190,65 +4141,65 @@
           <a:p>
             <a:pPr lvl="0"/>
             <a:r>
-              <a:rPr lang="en-US" noProof="1" smtClean="0"/>
+              <a:rPr lang="en-US" noProof="1"/>
               <a:t>Enter source code here</a:t>
             </a:r>
           </a:p>
           <a:p>
             <a:pPr lvl="0"/>
-            <a:endParaRPr lang="en-US" noProof="1" smtClean="0"/>
+            <a:endParaRPr lang="en-US" noProof="1"/>
           </a:p>
           <a:p>
             <a:pPr lvl="0"/>
-            <a:endParaRPr lang="en-US" noProof="1" smtClean="0"/>
+            <a:endParaRPr lang="en-US" noProof="1"/>
           </a:p>
           <a:p>
             <a:pPr lvl="0"/>
-            <a:endParaRPr lang="en-US" noProof="1" smtClean="0"/>
+            <a:endParaRPr lang="en-US" noProof="1"/>
           </a:p>
           <a:p>
             <a:pPr lvl="0"/>
-            <a:endParaRPr lang="en-US" noProof="1" smtClean="0"/>
+            <a:endParaRPr lang="en-US" noProof="1"/>
           </a:p>
           <a:p>
             <a:pPr lvl="0"/>
-            <a:endParaRPr lang="en-US" noProof="1" smtClean="0"/>
+            <a:endParaRPr lang="en-US" noProof="1"/>
           </a:p>
           <a:p>
             <a:pPr lvl="0"/>
-            <a:endParaRPr lang="en-US" noProof="1" smtClean="0"/>
+            <a:endParaRPr lang="en-US" noProof="1"/>
           </a:p>
           <a:p>
             <a:pPr lvl="0"/>
-            <a:endParaRPr lang="en-US" noProof="1" smtClean="0"/>
+            <a:endParaRPr lang="en-US" noProof="1"/>
           </a:p>
           <a:p>
             <a:pPr lvl="0"/>
-            <a:endParaRPr lang="en-US" noProof="1" smtClean="0"/>
+            <a:endParaRPr lang="en-US" noProof="1"/>
           </a:p>
           <a:p>
             <a:pPr lvl="0"/>
-            <a:endParaRPr lang="en-US" noProof="1" smtClean="0"/>
+            <a:endParaRPr lang="en-US" noProof="1"/>
           </a:p>
           <a:p>
             <a:pPr lvl="0"/>
-            <a:endParaRPr lang="en-US" noProof="1" smtClean="0"/>
+            <a:endParaRPr lang="en-US" noProof="1"/>
           </a:p>
           <a:p>
             <a:pPr lvl="0"/>
-            <a:endParaRPr lang="en-US" noProof="1" smtClean="0"/>
+            <a:endParaRPr lang="en-US" noProof="1"/>
           </a:p>
           <a:p>
             <a:pPr lvl="0"/>
-            <a:endParaRPr lang="en-US" noProof="1" smtClean="0"/>
+            <a:endParaRPr lang="en-US" noProof="1"/>
           </a:p>
           <a:p>
             <a:pPr lvl="0"/>
-            <a:endParaRPr lang="en-US" noProof="1" smtClean="0"/>
+            <a:endParaRPr lang="en-US" noProof="1"/>
           </a:p>
           <a:p>
             <a:pPr lvl="0"/>
-            <a:endParaRPr lang="en-US" noProof="1" smtClean="0"/>
+            <a:endParaRPr lang="en-US" noProof="1"/>
           </a:p>
         </p:txBody>
       </p:sp>
@@ -4365,10 +4316,9 @@
           </a:lstStyle>
           <a:p>
             <a:r>
-              <a:rPr lang="en-US" dirty="0" smtClean="0"/>
+              <a:rPr lang="en-US" dirty="0"/>
               <a:t>Section Title</a:t>
             </a:r>
-            <a:endParaRPr lang="en-US" dirty="0"/>
           </a:p>
         </p:txBody>
       </p:sp>
@@ -4453,10 +4403,9 @@
           </a:lstStyle>
           <a:p>
             <a:r>
-              <a:rPr lang="en-US" dirty="0" smtClean="0"/>
+              <a:rPr lang="en-US" dirty="0"/>
               <a:t>Section Subtitle</a:t>
             </a:r>
-            <a:endParaRPr lang="en-US" dirty="0"/>
           </a:p>
         </p:txBody>
       </p:sp>
@@ -4465,13 +4414,6 @@
   <p:clrMapOvr>
     <a:masterClrMapping/>
   </p:clrMapOvr>
-  <p:timing>
-    <p:tnLst>
-      <p:par>
-        <p:cTn id="1" dur="indefinite" restart="never" nodeType="tmRoot"/>
-      </p:par>
-    </p:tnLst>
-  </p:timing>
 </p:sldLayout>
 </file>
 
@@ -4540,7 +4482,7 @@
             <a:p>
               <a:pPr lvl="0"/>
               <a:r>
-                <a:rPr lang="bg-BG" sz="200" noProof="1" smtClean="0">
+                <a:rPr lang="bg-BG" sz="200" noProof="1">
                   <a:ln w="0">
                     <a:noFill/>
                   </a:ln>
@@ -4551,15 +4493,6 @@
                 </a:rPr>
                 <a:t>форум програмиране, форум уеб дизайн</a:t>
               </a:r>
-              <a:endParaRPr lang="bg-BG" sz="200" noProof="1">
-                <a:ln w="0">
-                  <a:noFill/>
-                </a:ln>
-                <a:solidFill>
-                  <a:schemeClr val="bg1"/>
-                </a:solidFill>
-                <a:effectLst/>
-              </a:endParaRPr>
             </a:p>
           </p:txBody>
         </p:sp>
@@ -4593,7 +4526,7 @@
                 </a:lnSpc>
               </a:pPr>
               <a:r>
-                <a:rPr lang="bg-BG" sz="200" kern="1200" noProof="1" smtClean="0">
+                <a:rPr lang="bg-BG" sz="200" kern="1200" noProof="1">
                   <a:ln w="0">
                     <a:noFill/>
                   </a:ln>
@@ -4607,18 +4540,6 @@
                 </a:rPr>
                 <a:t>курсове и уроци по програмиране, уеб дизайн – безплатно</a:t>
               </a:r>
-              <a:endParaRPr lang="bg-BG" sz="200" kern="1200" noProof="1">
-                <a:ln w="0">
-                  <a:noFill/>
-                </a:ln>
-                <a:solidFill>
-                  <a:schemeClr val="bg1"/>
-                </a:solidFill>
-                <a:effectLst/>
-                <a:latin typeface="Corbel" pitchFamily="34" charset="0"/>
-                <a:ea typeface="+mn-ea"/>
-                <a:cs typeface="+mn-cs"/>
-              </a:endParaRPr>
             </a:p>
           </p:txBody>
         </p:sp>
@@ -4647,7 +4568,7 @@
             <a:lstStyle/>
             <a:p>
               <a:r>
-                <a:rPr lang="bg-BG" sz="200" kern="1200" noProof="1" smtClean="0">
+                <a:rPr lang="bg-BG" sz="200" kern="1200" noProof="1">
                   <a:ln w="0">
                     <a:noFill/>
                   </a:ln>
@@ -4661,18 +4582,6 @@
                 </a:rPr>
                 <a:t>програмиране за деца – безплатни курсове и уроци</a:t>
               </a:r>
-              <a:endParaRPr lang="bg-BG" sz="200" kern="1200" noProof="1">
-                <a:ln w="0">
-                  <a:noFill/>
-                </a:ln>
-                <a:solidFill>
-                  <a:schemeClr val="bg1"/>
-                </a:solidFill>
-                <a:effectLst/>
-                <a:latin typeface="Corbel" pitchFamily="34" charset="0"/>
-                <a:ea typeface="+mn-ea"/>
-                <a:cs typeface="+mn-cs"/>
-              </a:endParaRPr>
             </a:p>
           </p:txBody>
         </p:sp>
@@ -4709,7 +4618,7 @@
             <a:p>
               <a:pPr lvl="0" algn="l"/>
               <a:r>
-                <a:rPr lang="bg-BG" sz="200" noProof="1" smtClean="0">
+                <a:rPr lang="bg-BG" sz="200" noProof="1">
                   <a:ln w="0">
                     <a:noFill/>
                   </a:ln>
@@ -4720,15 +4629,6 @@
                 </a:rPr>
                 <a:t>безплатен SEO курс - оптимизация за търсачки</a:t>
               </a:r>
-              <a:endParaRPr lang="bg-BG" sz="200" noProof="1">
-                <a:ln w="0">
-                  <a:noFill/>
-                </a:ln>
-                <a:solidFill>
-                  <a:schemeClr val="bg1"/>
-                </a:solidFill>
-                <a:effectLst/>
-              </a:endParaRPr>
             </a:p>
           </p:txBody>
         </p:sp>
@@ -4765,7 +4665,7 @@
             <a:p>
               <a:pPr lvl="0"/>
               <a:r>
-                <a:rPr lang="bg-BG" sz="200" noProof="1" smtClean="0">
+                <a:rPr lang="bg-BG" sz="200" noProof="1">
                   <a:ln w="0">
                     <a:noFill/>
                   </a:ln>
@@ -4776,15 +4676,6 @@
                 </a:rPr>
                 <a:t>уроци по уеб дизайн, HTML, CSS, JavaScript, Photoshop</a:t>
               </a:r>
-              <a:endParaRPr lang="bg-BG" sz="200" noProof="1">
-                <a:ln w="0">
-                  <a:noFill/>
-                </a:ln>
-                <a:solidFill>
-                  <a:schemeClr val="bg1"/>
-                </a:solidFill>
-                <a:effectLst/>
-              </a:endParaRPr>
             </a:p>
           </p:txBody>
         </p:sp>
@@ -4814,7 +4705,7 @@
             <a:p>
               <a:pPr algn="l"/>
               <a:r>
-                <a:rPr lang="bg-BG" sz="200" kern="1200" noProof="1" smtClean="0">
+                <a:rPr lang="bg-BG" sz="200" kern="1200" noProof="1">
                   <a:ln w="0">
                     <a:noFill/>
                   </a:ln>
@@ -4828,18 +4719,6 @@
                 </a:rPr>
                 <a:t>уроци по програмиране и уеб дизайн за ученици</a:t>
               </a:r>
-              <a:endParaRPr lang="bg-BG" sz="200" kern="1200" noProof="1">
-                <a:ln w="0">
-                  <a:noFill/>
-                </a:ln>
-                <a:solidFill>
-                  <a:schemeClr val="bg1"/>
-                </a:solidFill>
-                <a:effectLst/>
-                <a:latin typeface="Corbel" pitchFamily="34" charset="0"/>
-                <a:ea typeface="+mn-ea"/>
-                <a:cs typeface="+mn-cs"/>
-              </a:endParaRPr>
             </a:p>
           </p:txBody>
         </p:sp>
@@ -4876,7 +4755,7 @@
             <a:p>
               <a:pPr lvl="0"/>
               <a:r>
-                <a:rPr lang="bg-BG" sz="200" noProof="1" smtClean="0">
+                <a:rPr lang="bg-BG" sz="200" noProof="1">
                   <a:ln w="0">
                     <a:noFill/>
                   </a:ln>
@@ -4887,15 +4766,6 @@
                 </a:rPr>
                 <a:t>ASP.NET MVC курс – HTML, SQL, C#, .NET, ASP.NET MVC</a:t>
               </a:r>
-              <a:endParaRPr lang="bg-BG" sz="200" noProof="1">
-                <a:ln w="0">
-                  <a:noFill/>
-                </a:ln>
-                <a:solidFill>
-                  <a:schemeClr val="bg1"/>
-                </a:solidFill>
-                <a:effectLst/>
-              </a:endParaRPr>
             </a:p>
           </p:txBody>
         </p:sp>
@@ -4924,7 +4794,7 @@
             <a:lstStyle/>
             <a:p>
               <a:r>
-                <a:rPr lang="bg-BG" sz="200" kern="1200" noProof="1" smtClean="0">
+                <a:rPr lang="bg-BG" sz="200" kern="1200" noProof="1">
                   <a:ln w="0">
                     <a:noFill/>
                   </a:ln>
@@ -4938,18 +4808,6 @@
                 </a:rPr>
                 <a:t>безплатен курс "Разработка на софтуер в cloud среда"</a:t>
               </a:r>
-              <a:endParaRPr lang="bg-BG" sz="200" kern="1200" noProof="1">
-                <a:ln w="0">
-                  <a:noFill/>
-                </a:ln>
-                <a:solidFill>
-                  <a:schemeClr val="bg1"/>
-                </a:solidFill>
-                <a:effectLst/>
-                <a:latin typeface="Corbel" pitchFamily="34" charset="0"/>
-                <a:ea typeface="+mn-ea"/>
-                <a:cs typeface="+mn-cs"/>
-              </a:endParaRPr>
             </a:p>
           </p:txBody>
         </p:sp>
@@ -4986,7 +4844,7 @@
             <a:p>
               <a:pPr lvl="0"/>
               <a:r>
-                <a:rPr lang="bg-BG" sz="200" noProof="1" smtClean="0">
+                <a:rPr lang="bg-BG" sz="200" noProof="1">
                   <a:ln w="0">
                     <a:noFill/>
                   </a:ln>
@@ -4997,15 +4855,6 @@
                 </a:rPr>
                 <a:t>BG Coder - онлайн състезателна система - online judge</a:t>
               </a:r>
-              <a:endParaRPr lang="bg-BG" sz="200" noProof="1">
-                <a:ln w="0">
-                  <a:noFill/>
-                </a:ln>
-                <a:solidFill>
-                  <a:schemeClr val="bg1"/>
-                </a:solidFill>
-                <a:effectLst/>
-              </a:endParaRPr>
             </a:p>
           </p:txBody>
         </p:sp>
@@ -5042,7 +4891,7 @@
             <a:p>
               <a:pPr lvl="0"/>
               <a:r>
-                <a:rPr lang="bg-BG" sz="200" noProof="1" smtClean="0">
+                <a:rPr lang="bg-BG" sz="200" noProof="1">
                   <a:ln w="0">
                     <a:noFill/>
                   </a:ln>
@@ -5053,15 +4902,6 @@
                 </a:rPr>
                 <a:t>курсове и уроци по програмиране, книги – безплатно от Наков</a:t>
               </a:r>
-              <a:endParaRPr lang="bg-BG" sz="200" noProof="1">
-                <a:ln w="0">
-                  <a:noFill/>
-                </a:ln>
-                <a:solidFill>
-                  <a:schemeClr val="bg1"/>
-                </a:solidFill>
-                <a:effectLst/>
-              </a:endParaRPr>
             </a:p>
           </p:txBody>
         </p:sp>
@@ -5090,7 +4930,7 @@
             <a:lstStyle/>
             <a:p>
               <a:r>
-                <a:rPr lang="bg-BG" sz="200" kern="1200" noProof="1" smtClean="0">
+                <a:rPr lang="bg-BG" sz="200" kern="1200" noProof="1">
                   <a:ln w="0">
                     <a:noFill/>
                   </a:ln>
@@ -5104,18 +4944,6 @@
                 </a:rPr>
                 <a:t>безплатен курс "Качествен програмен код"</a:t>
               </a:r>
-              <a:endParaRPr lang="bg-BG" sz="200" kern="1200" noProof="1">
-                <a:ln w="0">
-                  <a:noFill/>
-                </a:ln>
-                <a:solidFill>
-                  <a:schemeClr val="bg1"/>
-                </a:solidFill>
-                <a:effectLst/>
-                <a:latin typeface="Corbel" pitchFamily="34" charset="0"/>
-                <a:ea typeface="+mn-ea"/>
-                <a:cs typeface="+mn-cs"/>
-              </a:endParaRPr>
             </a:p>
           </p:txBody>
         </p:sp>
@@ -5152,7 +4980,7 @@
             <a:p>
               <a:pPr lvl="0"/>
               <a:r>
-                <a:rPr lang="bg-BG" sz="200" noProof="1" smtClean="0">
+                <a:rPr lang="bg-BG" sz="200" noProof="1">
                   <a:ln w="0">
                     <a:noFill/>
                   </a:ln>
@@ -5163,15 +4991,6 @@
                 </a:rPr>
                 <a:t>алго академия – състезателно програмиране, състезания</a:t>
               </a:r>
-              <a:endParaRPr lang="bg-BG" sz="200" noProof="1">
-                <a:ln w="0">
-                  <a:noFill/>
-                </a:ln>
-                <a:solidFill>
-                  <a:schemeClr val="bg1"/>
-                </a:solidFill>
-                <a:effectLst/>
-              </a:endParaRPr>
             </a:p>
           </p:txBody>
         </p:sp>
@@ -5208,7 +5027,7 @@
             <a:p>
               <a:pPr lvl="0"/>
               <a:r>
-                <a:rPr lang="bg-BG" sz="200" noProof="1" smtClean="0">
+                <a:rPr lang="bg-BG" sz="200" noProof="1">
                   <a:ln w="0">
                     <a:noFill/>
                   </a:ln>
@@ -5219,15 +5038,6 @@
                 </a:rPr>
                 <a:t>ASP.NET курс - уеб програмиране, бази данни, C#, .NET, ASP.NET</a:t>
               </a:r>
-              <a:endParaRPr lang="bg-BG" sz="200" noProof="1">
-                <a:ln w="0">
-                  <a:noFill/>
-                </a:ln>
-                <a:solidFill>
-                  <a:schemeClr val="bg1"/>
-                </a:solidFill>
-                <a:effectLst/>
-              </a:endParaRPr>
             </a:p>
           </p:txBody>
         </p:sp>
@@ -5264,7 +5074,7 @@
             <a:p>
               <a:pPr lvl="0" algn="l"/>
               <a:r>
-                <a:rPr lang="bg-BG" sz="200" noProof="1" smtClean="0">
+                <a:rPr lang="bg-BG" sz="200" noProof="1">
                   <a:ln w="0">
                     <a:noFill/>
                   </a:ln>
@@ -5276,7 +5086,7 @@
                 <a:t>курсове и уроци по </a:t>
               </a:r>
               <a:r>
-                <a:rPr lang="bg-BG" sz="200" kern="1200" noProof="1" smtClean="0">
+                <a:rPr lang="bg-BG" sz="200" kern="1200" noProof="1">
                   <a:ln w="0">
                     <a:noFill/>
                   </a:ln>
@@ -5290,18 +5100,6 @@
                 </a:rPr>
                 <a:t>програмиране – Телерик академия</a:t>
               </a:r>
-              <a:endParaRPr lang="bg-BG" sz="200" kern="1200" noProof="1">
-                <a:ln w="0">
-                  <a:noFill/>
-                </a:ln>
-                <a:solidFill>
-                  <a:schemeClr val="bg1"/>
-                </a:solidFill>
-                <a:effectLst/>
-                <a:latin typeface="Corbel" pitchFamily="34" charset="0"/>
-                <a:ea typeface="+mn-ea"/>
-                <a:cs typeface="+mn-cs"/>
-              </a:endParaRPr>
             </a:p>
           </p:txBody>
         </p:sp>
@@ -5338,7 +5136,7 @@
             <a:p>
               <a:pPr lvl="0"/>
               <a:r>
-                <a:rPr lang="bg-BG" sz="200" noProof="1" smtClean="0">
+                <a:rPr lang="bg-BG" sz="200" noProof="1">
                   <a:ln w="0">
                     <a:noFill/>
                   </a:ln>
@@ -5349,15 +5147,6 @@
                 </a:rPr>
                 <a:t>курс мобилни приложения с iPhone, Android, WP7, PhoneGap</a:t>
               </a:r>
-              <a:endParaRPr lang="bg-BG" sz="200" noProof="1">
-                <a:ln w="0">
-                  <a:noFill/>
-                </a:ln>
-                <a:solidFill>
-                  <a:schemeClr val="bg1"/>
-                </a:solidFill>
-                <a:effectLst/>
-              </a:endParaRPr>
             </a:p>
           </p:txBody>
         </p:sp>
@@ -5386,7 +5175,7 @@
             <a:lstStyle/>
             <a:p>
               <a:r>
-                <a:rPr lang="bg-BG" sz="200" kern="1200" noProof="1" smtClean="0">
+                <a:rPr lang="bg-BG" sz="200" kern="1200" noProof="1">
                   <a:ln w="0">
                     <a:noFill/>
                   </a:ln>
@@ -5400,18 +5189,6 @@
                 </a:rPr>
                 <a:t>free C# book, безплатна книга C#, книга Java, книга C#</a:t>
               </a:r>
-              <a:endParaRPr lang="bg-BG" sz="200" kern="1200" noProof="1">
-                <a:ln w="0">
-                  <a:noFill/>
-                </a:ln>
-                <a:solidFill>
-                  <a:schemeClr val="bg1"/>
-                </a:solidFill>
-                <a:effectLst/>
-                <a:latin typeface="Corbel" pitchFamily="34" charset="0"/>
-                <a:ea typeface="+mn-ea"/>
-                <a:cs typeface="+mn-cs"/>
-              </a:endParaRPr>
             </a:p>
           </p:txBody>
         </p:sp>
@@ -5455,7 +5232,7 @@
             <a:p>
               <a:pPr lvl="0"/>
               <a:r>
-                <a:rPr lang="bg-BG" sz="200" noProof="1" smtClean="0">
+                <a:rPr lang="bg-BG" sz="200" noProof="1">
                   <a:ln w="0">
                     <a:noFill/>
                   </a:ln>
@@ -5465,14 +5242,6 @@
                 </a:rPr>
                 <a:t>Дончо Минков - сайт за програмиране</a:t>
               </a:r>
-              <a:endParaRPr lang="bg-BG" sz="200" noProof="1">
-                <a:ln w="0">
-                  <a:noFill/>
-                </a:ln>
-                <a:solidFill>
-                  <a:schemeClr val="bg1"/>
-                </a:solidFill>
-              </a:endParaRPr>
             </a:p>
           </p:txBody>
         </p:sp>
@@ -5502,7 +5271,7 @@
             <a:p>
               <a:pPr algn="l"/>
               <a:r>
-                <a:rPr lang="bg-BG" sz="200" kern="1200" noProof="1" smtClean="0">
+                <a:rPr lang="bg-BG" sz="200" kern="1200" noProof="1">
                   <a:ln w="0">
                     <a:noFill/>
                   </a:ln>
@@ -5516,18 +5285,6 @@
                 </a:rPr>
                 <a:t>Николай Костов - блог за програмиране</a:t>
               </a:r>
-              <a:endParaRPr lang="bg-BG" sz="200" kern="1200" noProof="1">
-                <a:ln w="0">
-                  <a:noFill/>
-                </a:ln>
-                <a:solidFill>
-                  <a:schemeClr val="bg1"/>
-                </a:solidFill>
-                <a:effectLst/>
-                <a:latin typeface="Corbel" pitchFamily="34" charset="0"/>
-                <a:ea typeface="+mn-ea"/>
-                <a:cs typeface="+mn-cs"/>
-              </a:endParaRPr>
             </a:p>
           </p:txBody>
         </p:sp>
@@ -5571,7 +5328,7 @@
             <a:p>
               <a:pPr lvl="0"/>
               <a:r>
-                <a:rPr lang="bg-BG" sz="200" noProof="1" smtClean="0">
+                <a:rPr lang="bg-BG" sz="200" noProof="1">
                   <a:ln w="0">
                     <a:noFill/>
                   </a:ln>
@@ -5581,14 +5338,6 @@
                 </a:rPr>
                 <a:t>C# курс, програмиране, безплатно</a:t>
               </a:r>
-              <a:endParaRPr lang="bg-BG" sz="200" noProof="1">
-                <a:ln w="0">
-                  <a:noFill/>
-                </a:ln>
-                <a:solidFill>
-                  <a:schemeClr val="bg1"/>
-                </a:solidFill>
-              </a:endParaRPr>
             </a:p>
           </p:txBody>
         </p:sp>
@@ -5650,10 +5399,9 @@
           </a:lstStyle>
           <a:p>
             <a:r>
-              <a:rPr lang="en-US" dirty="0" smtClean="0"/>
+              <a:rPr lang="en-US" dirty="0"/>
               <a:t>Presentation Title</a:t>
             </a:r>
-            <a:endParaRPr lang="en-US" dirty="0"/>
           </a:p>
         </p:txBody>
       </p:sp>
@@ -5689,7 +5437,7 @@
           <a:lstStyle/>
           <a:p>
             <a:r>
-              <a:rPr lang="en-US" sz="9600" b="1" dirty="0" smtClean="0">
+              <a:rPr lang="en-US" sz="9600" b="1" dirty="0">
                 <a:solidFill>
                   <a:schemeClr val="tx1">
                     <a:lumMod val="75000"/>
@@ -5701,16 +5449,6 @@
               </a:rPr>
               <a:t>?</a:t>
             </a:r>
-            <a:endParaRPr lang="en-US" sz="9600" b="1" dirty="0">
-              <a:solidFill>
-                <a:schemeClr val="tx1">
-                  <a:lumMod val="75000"/>
-                </a:schemeClr>
-              </a:solidFill>
-              <a:effectLst>
-                <a:reflection blurRad="6350" stA="55000" endA="300" endPos="45500" dir="5400000" sy="-100000" algn="bl" rotWithShape="0"/>
-              </a:effectLst>
-            </a:endParaRPr>
           </a:p>
         </p:txBody>
       </p:sp>
@@ -5746,7 +5484,7 @@
           <a:lstStyle/>
           <a:p>
             <a:r>
-              <a:rPr lang="en-US" sz="8800" dirty="0" smtClean="0">
+              <a:rPr lang="en-US" sz="8800" dirty="0">
                 <a:solidFill>
                   <a:schemeClr val="accent5">
                     <a:lumMod val="60000"/>
@@ -5759,17 +5497,6 @@
               </a:rPr>
               <a:t>?</a:t>
             </a:r>
-            <a:endParaRPr lang="en-US" sz="8800" dirty="0">
-              <a:solidFill>
-                <a:schemeClr val="accent5">
-                  <a:lumMod val="60000"/>
-                  <a:lumOff val="40000"/>
-                </a:schemeClr>
-              </a:solidFill>
-              <a:effectLst>
-                <a:reflection blurRad="6350" stA="55000" endA="300" endPos="45500" dir="5400000" sy="-100000" algn="bl" rotWithShape="0"/>
-              </a:effectLst>
-            </a:endParaRPr>
           </a:p>
         </p:txBody>
       </p:sp>
@@ -5805,7 +5532,7 @@
           <a:lstStyle/>
           <a:p>
             <a:r>
-              <a:rPr lang="en-US" sz="11500" b="1" dirty="0" smtClean="0">
+              <a:rPr lang="en-US" sz="11500" b="1" dirty="0">
                 <a:solidFill>
                   <a:srgbClr val="FF831D"/>
                 </a:solidFill>
@@ -5815,14 +5542,6 @@
               </a:rPr>
               <a:t>?</a:t>
             </a:r>
-            <a:endParaRPr lang="en-US" sz="11500" b="1" dirty="0">
-              <a:solidFill>
-                <a:srgbClr val="FF831D"/>
-              </a:solidFill>
-              <a:effectLst>
-                <a:reflection blurRad="6350" stA="55000" endA="300" endPos="45500" dir="5400000" sy="-100000" algn="bl" rotWithShape="0"/>
-              </a:effectLst>
-            </a:endParaRPr>
           </a:p>
         </p:txBody>
       </p:sp>
@@ -5865,7 +5584,7 @@
           <a:lstStyle/>
           <a:p>
             <a:r>
-              <a:rPr lang="en-US" sz="12800" b="1" dirty="0" smtClean="0">
+              <a:rPr lang="en-US" sz="12800" b="1" dirty="0">
                 <a:ln w="11430"/>
                 <a:gradFill>
                   <a:gsLst>
@@ -5913,52 +5632,6 @@
               </a:rPr>
               <a:t>?</a:t>
             </a:r>
-            <a:endParaRPr lang="en-US" sz="12800" b="1" dirty="0">
-              <a:ln w="11430"/>
-              <a:gradFill>
-                <a:gsLst>
-                  <a:gs pos="0">
-                    <a:schemeClr val="accent6">
-                      <a:tint val="90000"/>
-                      <a:satMod val="120000"/>
-                    </a:schemeClr>
-                  </a:gs>
-                  <a:gs pos="25000">
-                    <a:schemeClr val="accent6">
-                      <a:tint val="93000"/>
-                      <a:satMod val="120000"/>
-                    </a:schemeClr>
-                  </a:gs>
-                  <a:gs pos="50000">
-                    <a:schemeClr val="accent6">
-                      <a:shade val="89000"/>
-                      <a:satMod val="110000"/>
-                    </a:schemeClr>
-                  </a:gs>
-                  <a:gs pos="75000">
-                    <a:schemeClr val="accent6">
-                      <a:tint val="93000"/>
-                      <a:satMod val="120000"/>
-                    </a:schemeClr>
-                  </a:gs>
-                  <a:gs pos="100000">
-                    <a:schemeClr val="accent6">
-                      <a:tint val="90000"/>
-                      <a:satMod val="120000"/>
-                    </a:schemeClr>
-                  </a:gs>
-                </a:gsLst>
-                <a:lin ang="5400000"/>
-              </a:gradFill>
-              <a:effectLst>
-                <a:innerShdw blurRad="63500" dist="50800" dir="8100000">
-                  <a:prstClr val="black">
-                    <a:alpha val="50000"/>
-                  </a:prstClr>
-                </a:innerShdw>
-                <a:reflection blurRad="6350" stA="55000" endA="300" endPos="45500" dir="5400000" sy="-100000" algn="bl" rotWithShape="0"/>
-              </a:effectLst>
-            </a:endParaRPr>
           </a:p>
         </p:txBody>
       </p:sp>
@@ -5994,7 +5667,7 @@
           <a:lstStyle/>
           <a:p>
             <a:r>
-              <a:rPr lang="en-US" sz="5600" dirty="0" smtClean="0">
+              <a:rPr lang="en-US" sz="5600" dirty="0">
                 <a:solidFill>
                   <a:schemeClr val="tx2">
                     <a:lumMod val="75000"/>
@@ -6006,16 +5679,6 @@
               </a:rPr>
               <a:t>?</a:t>
             </a:r>
-            <a:endParaRPr lang="en-US" sz="5600" dirty="0">
-              <a:solidFill>
-                <a:schemeClr val="tx2">
-                  <a:lumMod val="75000"/>
-                </a:schemeClr>
-              </a:solidFill>
-              <a:effectLst>
-                <a:reflection blurRad="6350" stA="55000" endA="300" endPos="45500" dir="5400000" sy="-100000" algn="bl" rotWithShape="0"/>
-              </a:effectLst>
-            </a:endParaRPr>
           </a:p>
         </p:txBody>
       </p:sp>
@@ -6051,7 +5714,7 @@
           <a:lstStyle/>
           <a:p>
             <a:r>
-              <a:rPr lang="en-US" sz="9600" dirty="0" smtClean="0">
+              <a:rPr lang="en-US" sz="9600" dirty="0">
                 <a:solidFill>
                   <a:srgbClr val="FF4A37"/>
                 </a:solidFill>
@@ -6061,14 +5724,6 @@
               </a:rPr>
               <a:t>?</a:t>
             </a:r>
-            <a:endParaRPr lang="en-US" sz="9600" dirty="0">
-              <a:solidFill>
-                <a:srgbClr val="FF4A37"/>
-              </a:solidFill>
-              <a:effectLst>
-                <a:reflection blurRad="6350" stA="60000" endA="900" endPos="60000" dist="29997" dir="5400000" sy="-100000" algn="bl" rotWithShape="0"/>
-              </a:effectLst>
-            </a:endParaRPr>
           </a:p>
         </p:txBody>
       </p:sp>
@@ -6104,7 +5759,7 @@
           <a:lstStyle/>
           <a:p>
             <a:r>
-              <a:rPr lang="en-US" sz="3600" dirty="0" smtClean="0">
+              <a:rPr lang="en-US" sz="3600" dirty="0">
                 <a:solidFill>
                   <a:schemeClr val="tx2">
                     <a:lumMod val="40000"/>
@@ -6117,17 +5772,6 @@
               </a:rPr>
               <a:t>?</a:t>
             </a:r>
-            <a:endParaRPr lang="en-US" sz="3600" dirty="0">
-              <a:solidFill>
-                <a:schemeClr val="tx2">
-                  <a:lumMod val="40000"/>
-                  <a:lumOff val="60000"/>
-                </a:schemeClr>
-              </a:solidFill>
-              <a:effectLst>
-                <a:reflection blurRad="6350" stA="55000" endA="300" endPos="45500" dir="5400000" sy="-100000" algn="bl" rotWithShape="0"/>
-              </a:effectLst>
-            </a:endParaRPr>
           </a:p>
         </p:txBody>
       </p:sp>
@@ -6163,7 +5807,7 @@
           <a:lstStyle/>
           <a:p>
             <a:r>
-              <a:rPr lang="en-US" sz="6600" dirty="0" smtClean="0">
+              <a:rPr lang="en-US" sz="6600" dirty="0">
                 <a:solidFill>
                   <a:srgbClr val="9966FF"/>
                 </a:solidFill>
@@ -6173,14 +5817,6 @@
               </a:rPr>
               <a:t>?</a:t>
             </a:r>
-            <a:endParaRPr lang="en-US" sz="6600" dirty="0">
-              <a:solidFill>
-                <a:srgbClr val="9966FF"/>
-              </a:solidFill>
-              <a:effectLst>
-                <a:reflection blurRad="6350" stA="55000" endA="300" endPos="45500" dir="5400000" sy="-100000" algn="bl" rotWithShape="0"/>
-              </a:effectLst>
-            </a:endParaRPr>
           </a:p>
         </p:txBody>
       </p:sp>
@@ -6219,7 +5855,7 @@
           <a:lstStyle/>
           <a:p>
             <a:r>
-              <a:rPr lang="en-US" sz="4400" dirty="0" smtClean="0">
+              <a:rPr lang="en-US" sz="4400" dirty="0">
                 <a:solidFill>
                   <a:srgbClr val="FF6699"/>
                 </a:solidFill>
@@ -6229,14 +5865,6 @@
               </a:rPr>
               <a:t>?</a:t>
             </a:r>
-            <a:endParaRPr lang="en-US" sz="4400" dirty="0">
-              <a:solidFill>
-                <a:srgbClr val="FF6699"/>
-              </a:solidFill>
-              <a:effectLst>
-                <a:reflection blurRad="6350" stA="55000" endA="300" endPos="45500" dir="5400000" sy="-100000" algn="bl" rotWithShape="0"/>
-              </a:effectLst>
-            </a:endParaRPr>
           </a:p>
         </p:txBody>
       </p:sp>
@@ -6272,7 +5900,7 @@
           <a:lstStyle/>
           <a:p>
             <a:r>
-              <a:rPr lang="en-US" sz="3600" dirty="0" smtClean="0">
+              <a:rPr lang="en-US" sz="3600" dirty="0">
                 <a:solidFill>
                   <a:schemeClr val="tx2">
                     <a:lumMod val="40000"/>
@@ -6285,17 +5913,6 @@
               </a:rPr>
               <a:t>?</a:t>
             </a:r>
-            <a:endParaRPr lang="en-US" sz="3600" dirty="0">
-              <a:solidFill>
-                <a:schemeClr val="tx2">
-                  <a:lumMod val="40000"/>
-                  <a:lumOff val="60000"/>
-                </a:schemeClr>
-              </a:solidFill>
-              <a:effectLst>
-                <a:reflection blurRad="6350" stA="55000" endA="300" endPos="45500" dir="5400000" sy="-100000" algn="bl" rotWithShape="0"/>
-              </a:effectLst>
-            </a:endParaRPr>
           </a:p>
         </p:txBody>
       </p:sp>
@@ -6324,7 +5941,7 @@
           <a:lstStyle/>
           <a:p>
             <a:r>
-              <a:rPr lang="en-US" sz="6000" b="1" dirty="0" smtClean="0">
+              <a:rPr lang="en-US" sz="6000" b="1" dirty="0">
                 <a:ln w="1905"/>
                 <a:gradFill>
                   <a:gsLst>
@@ -6360,40 +5977,6 @@
               </a:rPr>
               <a:t>?</a:t>
             </a:r>
-            <a:endParaRPr lang="en-US" sz="6000" b="1" dirty="0">
-              <a:ln w="1905"/>
-              <a:gradFill>
-                <a:gsLst>
-                  <a:gs pos="0">
-                    <a:schemeClr val="accent6">
-                      <a:shade val="20000"/>
-                      <a:satMod val="200000"/>
-                    </a:schemeClr>
-                  </a:gs>
-                  <a:gs pos="78000">
-                    <a:schemeClr val="accent6">
-                      <a:tint val="90000"/>
-                      <a:shade val="89000"/>
-                      <a:satMod val="220000"/>
-                    </a:schemeClr>
-                  </a:gs>
-                  <a:gs pos="100000">
-                    <a:schemeClr val="accent6">
-                      <a:tint val="12000"/>
-                      <a:satMod val="255000"/>
-                    </a:schemeClr>
-                  </a:gs>
-                </a:gsLst>
-                <a:lin ang="5400000"/>
-              </a:gradFill>
-              <a:effectLst>
-                <a:innerShdw blurRad="69850" dist="43180" dir="5400000">
-                  <a:srgbClr val="000000">
-                    <a:alpha val="65000"/>
-                  </a:srgbClr>
-                </a:innerShdw>
-              </a:effectLst>
-            </a:endParaRPr>
           </a:p>
         </p:txBody>
       </p:sp>
@@ -6429,7 +6012,7 @@
           <a:lstStyle/>
           <a:p>
             <a:r>
-              <a:rPr lang="en-US" sz="4000" dirty="0" smtClean="0">
+              <a:rPr lang="en-US" sz="4000" dirty="0">
                 <a:solidFill>
                   <a:schemeClr val="accent4">
                     <a:lumMod val="60000"/>
@@ -6442,17 +6025,6 @@
               </a:rPr>
               <a:t>?</a:t>
             </a:r>
-            <a:endParaRPr lang="en-US" sz="4000" dirty="0">
-              <a:solidFill>
-                <a:schemeClr val="accent4">
-                  <a:lumMod val="60000"/>
-                  <a:lumOff val="40000"/>
-                </a:schemeClr>
-              </a:solidFill>
-              <a:effectLst>
-                <a:reflection blurRad="6350" stA="55000" endA="300" endPos="45500" dir="5400000" sy="-100000" algn="bl" rotWithShape="0"/>
-              </a:effectLst>
-            </a:endParaRPr>
           </a:p>
         </p:txBody>
       </p:sp>
@@ -6493,7 +6065,7 @@
           <a:lstStyle/>
           <a:p>
             <a:r>
-              <a:rPr lang="en-US" sz="4000" b="1" spc="150" dirty="0" smtClean="0">
+              <a:rPr lang="en-US" sz="4000" b="1" spc="150" dirty="0">
                 <a:ln w="11430"/>
                 <a:solidFill>
                   <a:schemeClr val="accent4">
@@ -6511,22 +6083,6 @@
               </a:rPr>
               <a:t>?</a:t>
             </a:r>
-            <a:endParaRPr lang="en-US" sz="4000" b="1" spc="150" dirty="0">
-              <a:ln w="11430"/>
-              <a:solidFill>
-                <a:schemeClr val="accent4">
-                  <a:lumMod val="60000"/>
-                  <a:lumOff val="40000"/>
-                </a:schemeClr>
-              </a:solidFill>
-              <a:effectLst>
-                <a:outerShdw blurRad="25400" algn="tl" rotWithShape="0">
-                  <a:srgbClr val="000000">
-                    <a:alpha val="43000"/>
-                  </a:srgbClr>
-                </a:outerShdw>
-              </a:effectLst>
-            </a:endParaRPr>
           </a:p>
         </p:txBody>
       </p:sp>
@@ -6555,7 +6111,7 @@
           <a:lstStyle/>
           <a:p>
             <a:r>
-              <a:rPr lang="en-US" sz="3600" b="1" dirty="0" smtClean="0">
+              <a:rPr lang="en-US" sz="3600" b="1" dirty="0">
                 <a:ln w="19050">
                   <a:solidFill>
                     <a:schemeClr val="accent4">
@@ -6644,7 +6200,7 @@
           <a:lstStyle/>
           <a:p>
             <a:r>
-              <a:rPr lang="en-US" sz="4400" dirty="0" smtClean="0">
+              <a:rPr lang="en-US" sz="4400" dirty="0">
                 <a:ln>
                   <a:solidFill>
                     <a:schemeClr val="accent2">
@@ -6665,25 +6221,6 @@
               </a:rPr>
               <a:t>?</a:t>
             </a:r>
-            <a:endParaRPr lang="en-US" sz="4400" dirty="0">
-              <a:ln>
-                <a:solidFill>
-                  <a:schemeClr val="accent2">
-                    <a:lumMod val="40000"/>
-                    <a:lumOff val="60000"/>
-                  </a:schemeClr>
-                </a:solidFill>
-              </a:ln>
-              <a:solidFill>
-                <a:schemeClr val="accent6">
-                  <a:lumMod val="60000"/>
-                  <a:lumOff val="40000"/>
-                </a:schemeClr>
-              </a:solidFill>
-              <a:effectLst>
-                <a:reflection blurRad="6350" stA="55000" endA="300" endPos="45500" dir="5400000" sy="-100000" algn="bl" rotWithShape="0"/>
-              </a:effectLst>
-            </a:endParaRPr>
           </a:p>
         </p:txBody>
       </p:sp>
@@ -6719,7 +6256,7 @@
           <a:lstStyle/>
           <a:p>
             <a:r>
-              <a:rPr lang="en-US" sz="2800" dirty="0" smtClean="0">
+              <a:rPr lang="en-US" sz="2800" dirty="0">
                 <a:ln>
                   <a:solidFill>
                     <a:schemeClr val="tx1">
@@ -6739,24 +6276,6 @@
               </a:rPr>
               <a:t>?</a:t>
             </a:r>
-            <a:endParaRPr lang="en-US" sz="2800" dirty="0">
-              <a:ln>
-                <a:solidFill>
-                  <a:schemeClr val="tx1">
-                    <a:lumMod val="75000"/>
-                  </a:schemeClr>
-                </a:solidFill>
-              </a:ln>
-              <a:solidFill>
-                <a:schemeClr val="accent4">
-                  <a:lumMod val="60000"/>
-                  <a:lumOff val="40000"/>
-                </a:schemeClr>
-              </a:solidFill>
-              <a:effectLst>
-                <a:reflection blurRad="6350" stA="55000" endA="300" endPos="45500" dir="5400000" sy="-100000" algn="bl" rotWithShape="0"/>
-              </a:effectLst>
-            </a:endParaRPr>
           </a:p>
         </p:txBody>
       </p:sp>
@@ -6792,7 +6311,7 @@
           <a:lstStyle/>
           <a:p>
             <a:r>
-              <a:rPr lang="en-US" sz="2800" b="1" dirty="0" smtClean="0">
+              <a:rPr lang="en-US" sz="2800" b="1" dirty="0">
                 <a:ln w="31550" cmpd="sng">
                   <a:solidFill>
                     <a:schemeClr val="tx2">
@@ -6875,7 +6394,7 @@
           <a:lstStyle/>
           <a:p>
             <a:r>
-              <a:rPr lang="en-US" sz="3200" dirty="0" smtClean="0">
+              <a:rPr lang="en-US" sz="3200" dirty="0">
                 <a:ln>
                   <a:solidFill>
                     <a:schemeClr val="accent1">
@@ -6896,25 +6415,6 @@
               </a:rPr>
               <a:t>?</a:t>
             </a:r>
-            <a:endParaRPr lang="en-US" sz="3200" dirty="0">
-              <a:ln>
-                <a:solidFill>
-                  <a:schemeClr val="accent1">
-                    <a:lumMod val="40000"/>
-                    <a:lumOff val="60000"/>
-                  </a:schemeClr>
-                </a:solidFill>
-              </a:ln>
-              <a:solidFill>
-                <a:schemeClr val="accent4">
-                  <a:lumMod val="60000"/>
-                  <a:lumOff val="40000"/>
-                </a:schemeClr>
-              </a:solidFill>
-              <a:effectLst>
-                <a:reflection blurRad="6350" stA="55000" endA="300" endPos="45500" dir="5400000" sy="-100000" algn="bl" rotWithShape="0"/>
-              </a:effectLst>
-            </a:endParaRPr>
           </a:p>
         </p:txBody>
       </p:sp>
@@ -6972,7 +6472,7 @@
               <a:buNone/>
             </a:pPr>
             <a:r>
-              <a:rPr lang="en-US" sz="7600" b="1" spc="150" noProof="0" dirty="0" smtClean="0">
+              <a:rPr lang="en-US" sz="7600" b="1" spc="150" noProof="0" dirty="0">
                 <a:ln w="11430"/>
                 <a:solidFill>
                   <a:schemeClr val="tx1">
@@ -7043,10 +6543,9 @@
           <a:p>
             <a:pPr lvl="0"/>
             <a:r>
-              <a:rPr lang="en-US" dirty="0" smtClean="0"/>
+              <a:rPr lang="en-US" dirty="0"/>
               <a:t>Course web site URL</a:t>
             </a:r>
-            <a:endParaRPr lang="en-US" dirty="0"/>
           </a:p>
         </p:txBody>
       </p:sp>
@@ -7087,7 +6586,7 @@
               </a:lnSpc>
             </a:pPr>
             <a:r>
-              <a:rPr lang="en-US" sz="12000" b="1" dirty="0" smtClean="0">
+              <a:rPr lang="en-US" sz="12000" b="1" dirty="0">
                 <a:solidFill>
                   <a:srgbClr val="FFBF8B"/>
                 </a:solidFill>
@@ -7098,15 +6597,6 @@
               </a:rPr>
               <a:t>?</a:t>
             </a:r>
-            <a:endParaRPr lang="en-US" sz="12000" b="1" dirty="0">
-              <a:solidFill>
-                <a:srgbClr val="FFBF8B"/>
-              </a:solidFill>
-              <a:effectLst>
-                <a:reflection blurRad="6350" stA="55000" endA="300" endPos="45500" dir="5400000" sy="-100000" algn="bl" rotWithShape="0"/>
-              </a:effectLst>
-              <a:latin typeface="Cambria" pitchFamily="18" charset="0"/>
-            </a:endParaRPr>
           </a:p>
         </p:txBody>
       </p:sp>
@@ -7115,13 +6605,6 @@
   <p:clrMapOvr>
     <a:masterClrMapping/>
   </p:clrMapOvr>
-  <p:timing>
-    <p:tnLst>
-      <p:par>
-        <p:cTn id="1" dur="indefinite" restart="never" nodeType="tmRoot"/>
-      </p:par>
-    </p:tnLst>
-  </p:timing>
 </p:sldLayout>
 </file>
 
@@ -7187,10 +6670,9 @@
           </a:lstStyle>
           <a:p>
             <a:r>
-              <a:rPr lang="en-US" dirty="0" smtClean="0"/>
+              <a:rPr lang="en-US" dirty="0"/>
               <a:t>Presentation Title</a:t>
             </a:r>
-            <a:endParaRPr lang="en-US" dirty="0"/>
           </a:p>
         </p:txBody>
       </p:sp>
@@ -7251,10 +6733,9 @@
           </a:lstStyle>
           <a:p>
             <a:r>
-              <a:rPr lang="en-US" dirty="0" smtClean="0"/>
+              <a:rPr lang="en-US" dirty="0"/>
               <a:t>Presentation Subtitle</a:t>
             </a:r>
-            <a:endParaRPr lang="en-US" dirty="0"/>
           </a:p>
         </p:txBody>
       </p:sp>
@@ -7357,10 +6838,9 @@
           <a:p>
             <a:pPr lvl="0"/>
             <a:r>
-              <a:rPr lang="en-US" dirty="0" smtClean="0"/>
+              <a:rPr lang="en-US" dirty="0"/>
               <a:t>Author Name</a:t>
             </a:r>
-            <a:endParaRPr lang="en-US" dirty="0"/>
           </a:p>
         </p:txBody>
       </p:sp>
@@ -7417,7 +6897,7 @@
           <a:p>
             <a:pPr algn="l"/>
             <a:r>
-              <a:rPr lang="en-US" sz="1800" b="1" dirty="0" smtClean="0">
+              <a:rPr lang="en-US" sz="1800" b="1" dirty="0">
                 <a:solidFill>
                   <a:srgbClr val="0EFE58"/>
                 </a:solidFill>
@@ -7431,18 +6911,6 @@
               </a:rPr>
               <a:t>Telerik Corporation</a:t>
             </a:r>
-            <a:endParaRPr lang="en-US" sz="1800" b="1" dirty="0">
-              <a:solidFill>
-                <a:srgbClr val="0EFE58"/>
-              </a:solidFill>
-              <a:effectLst>
-                <a:outerShdw blurRad="38100" dist="38100" dir="2700000" algn="tl">
-                  <a:srgbClr val="000000">
-                    <a:alpha val="43137"/>
-                  </a:srgbClr>
-                </a:outerShdw>
-              </a:effectLst>
-            </a:endParaRPr>
           </a:p>
         </p:txBody>
       </p:sp>
@@ -7499,7 +6967,7 @@
           <a:p>
             <a:pPr algn="l"/>
             <a:r>
-              <a:rPr lang="en-US" sz="1600" b="1" dirty="0" smtClean="0">
+              <a:rPr lang="en-US" sz="1600" b="1" dirty="0">
                 <a:solidFill>
                   <a:schemeClr val="tx1">
                     <a:lumMod val="50000"/>
@@ -7589,13 +7057,6 @@
   <p:clrMapOvr>
     <a:masterClrMapping/>
   </p:clrMapOvr>
-  <p:timing>
-    <p:tnLst>
-      <p:par>
-        <p:cTn id="1" dur="indefinite" restart="never" nodeType="tmRoot"/>
-      </p:par>
-    </p:tnLst>
-  </p:timing>
 </p:sldLayout>
 </file>
 
@@ -7626,13 +7087,6 @@
   <p:clrMapOvr>
     <a:masterClrMapping/>
   </p:clrMapOvr>
-  <p:timing>
-    <p:tnLst>
-      <p:par>
-        <p:cTn id="1" dur="indefinite" restart="never" nodeType="tmRoot"/>
-      </p:par>
-    </p:tnLst>
-  </p:timing>
 </p:sldLayout>
 </file>
 
@@ -7900,13 +7354,6 @@
     <p:sldLayoutId id="2147483705" r:id="rId6"/>
     <p:sldLayoutId id="2147483707" r:id="rId7"/>
   </p:sldLayoutIdLst>
-  <p:timing>
-    <p:tnLst>
-      <p:par>
-        <p:cTn id="1" dur="indefinite" restart="never" nodeType="tmRoot"/>
-      </p:par>
-    </p:tnLst>
-  </p:timing>
   <p:hf hdr="0" ftr="0" dt="0"/>
   <p:txStyles>
     <p:titleStyle>
@@ -8425,7 +7872,7 @@
           <a:lstStyle/>
           <a:p>
             <a:r>
-              <a:rPr lang="en-US" sz="6000" dirty="0" smtClean="0"/>
+              <a:rPr lang="en-US" sz="6000" dirty="0"/>
               <a:t>Academy Popcorn "API"</a:t>
             </a:r>
             <a:endParaRPr lang="en-US" sz="4600" dirty="0"/>
@@ -8458,7 +7905,7 @@
               </a:spcBef>
             </a:pPr>
             <a:r>
-              <a:rPr lang="en-US" dirty="0" smtClean="0"/>
+              <a:rPr lang="en-US" dirty="0"/>
               <a:t>Description, Classes, Interfaces, Hierarchy, Specifics</a:t>
             </a:r>
             <a:endParaRPr lang="bg-BG" dirty="0"/>
@@ -8724,10 +8171,9 @@
           </a:lstStyle>
           <a:p>
             <a:r>
-              <a:rPr lang="en-US" dirty="0" smtClean="0"/>
+              <a:rPr lang="en-US" dirty="0"/>
               <a:t>George Georgiev</a:t>
             </a:r>
-            <a:endParaRPr lang="en-US" dirty="0"/>
           </a:p>
         </p:txBody>
       </p:sp>
@@ -8993,10 +8439,9 @@
           </a:lstStyle>
           <a:p>
             <a:r>
-              <a:rPr lang="en-US" dirty="0" smtClean="0"/>
+              <a:rPr lang="en-US" dirty="0"/>
               <a:t>Telerik Software Academy</a:t>
             </a:r>
-            <a:endParaRPr lang="en-US" dirty="0"/>
           </a:p>
         </p:txBody>
       </p:sp>
@@ -9259,16 +8704,15 @@
           </a:lstStyle>
           <a:p>
             <a:r>
-              <a:rPr lang="en-US" dirty="0" smtClean="0">
+              <a:rPr lang="en-US" dirty="0">
                 <a:hlinkClick r:id="rId2"/>
               </a:rPr>
               <a:t>academy.telerik.com</a:t>
             </a:r>
             <a:r>
-              <a:rPr lang="en-US" dirty="0" smtClean="0"/>
+              <a:rPr lang="en-US" dirty="0"/>
               <a:t>   </a:t>
             </a:r>
-            <a:endParaRPr lang="en-US" dirty="0"/>
           </a:p>
         </p:txBody>
       </p:sp>
@@ -9533,10 +8977,9 @@
           </a:lstStyle>
           <a:p>
             <a:r>
-              <a:rPr lang="en-US" dirty="0" smtClean="0"/>
+              <a:rPr lang="en-US" dirty="0"/>
               <a:t>Technical Trainer</a:t>
             </a:r>
-            <a:endParaRPr lang="en-US" dirty="0"/>
           </a:p>
         </p:txBody>
       </p:sp>
@@ -9801,16 +9244,15 @@
           </a:lstStyle>
           <a:p>
             <a:r>
-              <a:rPr lang="en-US" sz="1800" dirty="0" smtClean="0">
+              <a:rPr lang="en-US" sz="1800" dirty="0">
                 <a:hlinkClick r:id="rId3"/>
               </a:rPr>
               <a:t>itgeorge.net</a:t>
             </a:r>
             <a:r>
-              <a:rPr lang="en-US" sz="1800" dirty="0" smtClean="0"/>
+              <a:rPr lang="en-US" sz="1800" dirty="0"/>
               <a:t> </a:t>
             </a:r>
-            <a:endParaRPr lang="en-US" sz="1800" dirty="0"/>
           </a:p>
         </p:txBody>
       </p:sp>
@@ -9865,13 +9307,6 @@
   <p:clrMapOvr>
     <a:masterClrMapping/>
   </p:clrMapOvr>
-  <p:timing>
-    <p:tnLst>
-      <p:par>
-        <p:cTn id="1" dur="indefinite" restart="never" nodeType="tmRoot"/>
-      </p:par>
-    </p:tnLst>
-  </p:timing>
 </p:sld>
 </file>
 
@@ -9924,10 +9359,9 @@
               </a:lnSpc>
             </a:pPr>
             <a:r>
-              <a:rPr lang="en-US" sz="4800" dirty="0" smtClean="0"/>
+              <a:rPr lang="en-US" sz="4800" dirty="0"/>
               <a:t>The Block class</a:t>
             </a:r>
-            <a:endParaRPr lang="en-US" sz="4800" dirty="0"/>
           </a:p>
         </p:txBody>
       </p:sp>
@@ -10248,13 +9682,6 @@
     <a:masterClrMapping/>
   </p:clrMapOvr>
   <p:transition/>
-  <p:timing>
-    <p:tnLst>
-      <p:par>
-        <p:cTn id="1" dur="indefinite" restart="never" nodeType="tmRoot"/>
-      </p:par>
-    </p:tnLst>
-  </p:timing>
 </p:sld>
 </file>
 
@@ -10301,7 +9728,7 @@
               <a:defRPr/>
             </a:pPr>
             <a:r>
-              <a:rPr lang="en-US" sz="4000" dirty="0" smtClean="0"/>
+              <a:rPr lang="en-US" sz="4000" dirty="0"/>
               <a:t>The Block class</a:t>
             </a:r>
             <a:endParaRPr lang="bg-BG" sz="4000" dirty="0"/>
@@ -10337,7 +9764,7 @@
               </a:lnSpc>
             </a:pPr>
             <a:r>
-              <a:rPr lang="en-US" dirty="0" smtClean="0">
+              <a:rPr lang="en-US" dirty="0">
                 <a:solidFill>
                   <a:schemeClr val="tx1">
                     <a:lumMod val="40000"/>
@@ -10355,7 +9782,7 @@
               </a:lnSpc>
             </a:pPr>
             <a:r>
-              <a:rPr lang="en-US" dirty="0" smtClean="0">
+              <a:rPr lang="en-US" dirty="0">
                 <a:solidFill>
                   <a:schemeClr val="tx1">
                     <a:lumMod val="40000"/>
@@ -10373,7 +9800,7 @@
               </a:lnSpc>
             </a:pPr>
             <a:r>
-              <a:rPr lang="en-US" dirty="0" smtClean="0">
+              <a:rPr lang="en-US" dirty="0">
                 <a:solidFill>
                   <a:schemeClr val="tx1">
                     <a:lumMod val="40000"/>
@@ -10384,7 +9811,7 @@
               <a:t>Has implemented </a:t>
             </a:r>
             <a:r>
-              <a:rPr lang="en-US" dirty="0" err="1" smtClean="0">
+              <a:rPr lang="en-US" dirty="0" err="1">
                 <a:solidFill>
                   <a:schemeClr val="tx1">
                     <a:lumMod val="40000"/>
@@ -10395,7 +9822,7 @@
               <a:t>ICollidable</a:t>
             </a:r>
             <a:r>
-              <a:rPr lang="en-US" dirty="0" smtClean="0">
+              <a:rPr lang="en-US" dirty="0">
                 <a:solidFill>
                   <a:schemeClr val="tx1">
                     <a:lumMod val="40000"/>
@@ -10413,15 +9840,15 @@
               </a:lnSpc>
             </a:pPr>
             <a:r>
-              <a:rPr lang="en-US" dirty="0" smtClean="0"/>
+              <a:rPr lang="en-US" dirty="0"/>
               <a:t>Note: all classes inheriting GameObject MUST implement the </a:t>
             </a:r>
             <a:r>
-              <a:rPr lang="en-US" dirty="0" err="1" smtClean="0"/>
+              <a:rPr lang="en-US" dirty="0" err="1"/>
               <a:t>ICollidable</a:t>
             </a:r>
             <a:r>
-              <a:rPr lang="en-US" dirty="0" smtClean="0"/>
+              <a:rPr lang="en-US" dirty="0"/>
               <a:t> methods if they need specific collision detection</a:t>
             </a:r>
           </a:p>
@@ -10432,7 +9859,7 @@
               </a:lnSpc>
             </a:pPr>
             <a:r>
-              <a:rPr lang="en-US" dirty="0" smtClean="0">
+              <a:rPr lang="en-US" dirty="0">
                 <a:solidFill>
                   <a:schemeClr val="tx1">
                     <a:lumMod val="40000"/>
@@ -10450,7 +9877,7 @@
               </a:lnSpc>
             </a:pPr>
             <a:r>
-              <a:rPr lang="en-US" dirty="0" smtClean="0"/>
+              <a:rPr lang="en-US" dirty="0"/>
               <a:t>1x1 char matrix with a symbol</a:t>
             </a:r>
           </a:p>
@@ -10518,13 +9945,6 @@
     <a:masterClrMapping/>
   </p:clrMapOvr>
   <p:transition/>
-  <p:timing>
-    <p:tnLst>
-      <p:par>
-        <p:cTn id="1" dur="indefinite" restart="never" nodeType="tmRoot"/>
-      </p:par>
-    </p:tnLst>
-  </p:timing>
 </p:sld>
 </file>
 
@@ -10578,18 +9998,10 @@
             </a:pPr>
             <a:r>
               <a:rPr lang="en-US" sz="4800" dirty="0"/>
-              <a:t>The IRenderer </a:t>
-            </a:r>
-            <a:r>
-              <a:rPr lang="en-US" sz="4800" dirty="0" smtClean="0"/>
-              <a:t>Interface </a:t>
-            </a:r>
-            <a:r>
-              <a:rPr lang="en-US" sz="4800" dirty="0"/>
-              <a:t>and </a:t>
-            </a:r>
-            <a:r>
-              <a:rPr lang="en-US" sz="4800" dirty="0" err="1" smtClean="0"/>
+              <a:t>The IRenderer Interface and </a:t>
+            </a:r>
+            <a:r>
+              <a:rPr lang="en-US" sz="4800" dirty="0" err="1"/>
               <a:t>ConsoleRenderer</a:t>
             </a:r>
             <a:endParaRPr lang="en-US" sz="4800" dirty="0"/>
@@ -10687,13 +10099,6 @@
     <a:masterClrMapping/>
   </p:clrMapOvr>
   <p:transition/>
-  <p:timing>
-    <p:tnLst>
-      <p:par>
-        <p:cTn id="1" dur="indefinite" restart="never" nodeType="tmRoot"/>
-      </p:par>
-    </p:tnLst>
-  </p:timing>
 </p:sld>
 </file>
 
@@ -10740,11 +10145,11 @@
               <a:defRPr/>
             </a:pPr>
             <a:r>
-              <a:rPr lang="en-US" sz="4000" dirty="0" smtClean="0"/>
+              <a:rPr lang="en-US" sz="4000" dirty="0"/>
               <a:t>IRenderer &amp; </a:t>
             </a:r>
             <a:r>
-              <a:rPr lang="en-US" sz="4000" dirty="0" err="1" smtClean="0"/>
+              <a:rPr lang="en-US" sz="4000" dirty="0" err="1"/>
               <a:t>ConsoleRenderer</a:t>
             </a:r>
             <a:endParaRPr lang="bg-BG" sz="4000" dirty="0"/>
@@ -10783,7 +10188,7 @@
               </a:spcBef>
             </a:pPr>
             <a:r>
-              <a:rPr lang="en-US" dirty="0" smtClean="0">
+              <a:rPr lang="en-US" dirty="0">
                 <a:solidFill>
                   <a:schemeClr val="tx1">
                     <a:lumMod val="40000"/>
@@ -10794,7 +10199,7 @@
               <a:t>IRenderer – provides interface to methods for displaying </a:t>
             </a:r>
             <a:r>
-              <a:rPr lang="en-US" dirty="0" err="1" smtClean="0">
+              <a:rPr lang="en-US" dirty="0" err="1">
                 <a:solidFill>
                   <a:schemeClr val="tx1">
                     <a:lumMod val="40000"/>
@@ -10804,7 +10209,7 @@
               </a:rPr>
               <a:t>IRenderable</a:t>
             </a:r>
-            <a:endParaRPr lang="en-US" dirty="0" smtClean="0">
+            <a:endParaRPr lang="en-US" dirty="0">
               <a:solidFill>
                 <a:schemeClr val="tx1">
                   <a:lumMod val="40000"/>
@@ -10823,23 +10228,19 @@
               </a:spcBef>
             </a:pPr>
             <a:r>
-              <a:rPr lang="en-US" dirty="0" err="1" smtClean="0"/>
+              <a:rPr lang="en-US" dirty="0" err="1"/>
               <a:t>EnqueueForRendering</a:t>
             </a:r>
             <a:r>
               <a:rPr lang="en-US" dirty="0"/>
-              <a:t> </a:t>
-            </a:r>
-            <a:r>
-              <a:rPr lang="en-US" dirty="0" smtClean="0"/>
-              <a:t>– adds a </a:t>
-            </a:r>
-            <a:r>
-              <a:rPr lang="en-US" dirty="0" err="1" smtClean="0"/>
+              <a:t> – adds a </a:t>
+            </a:r>
+            <a:r>
+              <a:rPr lang="en-US" dirty="0" err="1"/>
               <a:t>IRenderable</a:t>
             </a:r>
             <a:r>
-              <a:rPr lang="en-US" dirty="0" smtClean="0"/>
+              <a:rPr lang="en-US" dirty="0"/>
               <a:t> to the rendering queue</a:t>
             </a:r>
           </a:p>
@@ -10853,11 +10254,11 @@
               </a:spcBef>
             </a:pPr>
             <a:r>
-              <a:rPr lang="en-US" dirty="0" err="1" smtClean="0"/>
+              <a:rPr lang="en-US" dirty="0" err="1"/>
               <a:t>RenderAll</a:t>
             </a:r>
             <a:r>
-              <a:rPr lang="en-US" dirty="0" smtClean="0"/>
+              <a:rPr lang="en-US" dirty="0"/>
               <a:t> – flushes the rendering queue to the screen</a:t>
             </a:r>
           </a:p>
@@ -10871,11 +10272,11 @@
               </a:spcBef>
             </a:pPr>
             <a:r>
-              <a:rPr lang="en-US" dirty="0" err="1" smtClean="0"/>
+              <a:rPr lang="en-US" dirty="0" err="1"/>
               <a:t>ClearQueue</a:t>
             </a:r>
             <a:r>
-              <a:rPr lang="en-US" dirty="0" smtClean="0"/>
+              <a:rPr lang="en-US" dirty="0"/>
               <a:t> – removes all objects from the rendering queue</a:t>
             </a:r>
           </a:p>
@@ -10889,14 +10290,14 @@
               </a:spcBef>
             </a:pPr>
             <a:r>
-              <a:rPr lang="en-US" dirty="0" smtClean="0"/>
+              <a:rPr lang="en-US" dirty="0"/>
               <a:t>Should be called after </a:t>
             </a:r>
             <a:r>
-              <a:rPr lang="en-US" dirty="0" err="1" smtClean="0"/>
+              <a:rPr lang="en-US" dirty="0" err="1"/>
               <a:t>RenderAll</a:t>
             </a:r>
-            <a:endParaRPr lang="en-US" dirty="0" smtClean="0"/>
+            <a:endParaRPr lang="en-US" dirty="0"/>
           </a:p>
           <a:p>
             <a:pPr>
@@ -10908,11 +10309,11 @@
               </a:spcBef>
             </a:pPr>
             <a:r>
-              <a:rPr lang="en-US" dirty="0" err="1" smtClean="0"/>
+              <a:rPr lang="en-US" dirty="0" err="1"/>
               <a:t>ConsoleRenderer</a:t>
             </a:r>
             <a:r>
-              <a:rPr lang="en-US" dirty="0" smtClean="0"/>
+              <a:rPr lang="en-US" dirty="0"/>
               <a:t> – implements IRenderer for console display</a:t>
             </a:r>
           </a:p>
@@ -10980,13 +10381,6 @@
     <a:masterClrMapping/>
   </p:clrMapOvr>
   <p:transition/>
-  <p:timing>
-    <p:tnLst>
-      <p:par>
-        <p:cTn id="1" dur="indefinite" restart="never" nodeType="tmRoot"/>
-      </p:par>
-    </p:tnLst>
-  </p:timing>
 </p:sld>
 </file>
 
@@ -11039,18 +10433,17 @@
               </a:lnSpc>
             </a:pPr>
             <a:r>
-              <a:rPr lang="en-US" sz="4800" dirty="0" smtClean="0"/>
+              <a:rPr lang="en-US" sz="4800" dirty="0"/>
               <a:t>The </a:t>
             </a:r>
             <a:r>
-              <a:rPr lang="en-US" sz="4800" dirty="0" err="1" smtClean="0"/>
+              <a:rPr lang="en-US" sz="4800" dirty="0" err="1"/>
               <a:t>MovingObject</a:t>
             </a:r>
             <a:r>
-              <a:rPr lang="en-US" sz="4800" dirty="0" smtClean="0"/>
+              <a:rPr lang="en-US" sz="4800" dirty="0"/>
               <a:t> and Ball Classes</a:t>
             </a:r>
-            <a:endParaRPr lang="en-US" sz="4800" dirty="0"/>
           </a:p>
         </p:txBody>
       </p:sp>
@@ -11106,13 +10499,6 @@
     <a:masterClrMapping/>
   </p:clrMapOvr>
   <p:transition/>
-  <p:timing>
-    <p:tnLst>
-      <p:par>
-        <p:cTn id="1" dur="indefinite" restart="never" nodeType="tmRoot"/>
-      </p:par>
-    </p:tnLst>
-  </p:timing>
 </p:sld>
 </file>
 
@@ -11159,11 +10545,11 @@
               <a:defRPr/>
             </a:pPr>
             <a:r>
-              <a:rPr lang="en-US" sz="4000" dirty="0" err="1" smtClean="0"/>
+              <a:rPr lang="en-US" sz="4000" dirty="0" err="1"/>
               <a:t>MovingObject</a:t>
             </a:r>
             <a:r>
-              <a:rPr lang="en-US" sz="4000" dirty="0" smtClean="0"/>
+              <a:rPr lang="en-US" sz="4000" dirty="0"/>
               <a:t> &amp; Ball</a:t>
             </a:r>
             <a:endParaRPr lang="bg-BG" sz="4000" dirty="0"/>
@@ -11202,11 +10588,11 @@
               </a:spcBef>
             </a:pPr>
             <a:r>
-              <a:rPr lang="en-US" dirty="0" err="1" smtClean="0"/>
+              <a:rPr lang="en-US" dirty="0" err="1"/>
               <a:t>MovingObject</a:t>
             </a:r>
             <a:r>
-              <a:rPr lang="en-US" dirty="0" smtClean="0"/>
+              <a:rPr lang="en-US" dirty="0"/>
               <a:t> – game object with a speed property</a:t>
             </a:r>
           </a:p>
@@ -11220,7 +10606,7 @@
               </a:spcBef>
             </a:pPr>
             <a:r>
-              <a:rPr lang="en-US" dirty="0" smtClean="0"/>
+              <a:rPr lang="en-US" dirty="0"/>
               <a:t>Speed is a vector</a:t>
             </a:r>
           </a:p>
@@ -11234,14 +10620,14 @@
               </a:spcBef>
             </a:pPr>
             <a:r>
-              <a:rPr lang="en-US" dirty="0" smtClean="0"/>
+              <a:rPr lang="en-US" dirty="0"/>
               <a:t>Represented by instance of </a:t>
             </a:r>
             <a:r>
-              <a:rPr lang="en-US" dirty="0" err="1" smtClean="0"/>
+              <a:rPr lang="en-US" dirty="0" err="1"/>
               <a:t>MatrixCoords</a:t>
             </a:r>
-            <a:endParaRPr lang="en-US" dirty="0" smtClean="0"/>
+            <a:endParaRPr lang="en-US" dirty="0"/>
           </a:p>
           <a:p>
             <a:pPr lvl="2">
@@ -11253,23 +10639,23 @@
               </a:spcBef>
             </a:pPr>
             <a:r>
-              <a:rPr lang="en-US" dirty="0" smtClean="0"/>
+              <a:rPr lang="en-US" dirty="0"/>
               <a:t>Imagine "delta" </a:t>
             </a:r>
             <a:r>
-              <a:rPr lang="en-US" dirty="0" err="1" smtClean="0"/>
+              <a:rPr lang="en-US" dirty="0" err="1"/>
               <a:t>coords</a:t>
             </a:r>
             <a:r>
-              <a:rPr lang="en-US" dirty="0" smtClean="0"/>
+              <a:rPr lang="en-US" dirty="0"/>
               <a:t> – the change of </a:t>
             </a:r>
             <a:r>
-              <a:rPr lang="en-US" dirty="0" err="1" smtClean="0"/>
+              <a:rPr lang="en-US" dirty="0" err="1"/>
               <a:t>TopLeft</a:t>
             </a:r>
             <a:r>
-              <a:rPr lang="en-US" dirty="0" smtClean="0"/>
+              <a:rPr lang="en-US" dirty="0"/>
               <a:t> at each "turn"</a:t>
             </a:r>
           </a:p>
@@ -11283,7 +10669,7 @@
               </a:spcBef>
             </a:pPr>
             <a:r>
-              <a:rPr lang="en-US" dirty="0" smtClean="0"/>
+              <a:rPr lang="en-US" dirty="0"/>
               <a:t>Has overridden Update</a:t>
             </a:r>
           </a:p>
@@ -11297,15 +10683,15 @@
               </a:spcBef>
             </a:pPr>
             <a:r>
-              <a:rPr lang="en-US" dirty="0" smtClean="0"/>
+              <a:rPr lang="en-US" dirty="0"/>
               <a:t>Updates the </a:t>
             </a:r>
             <a:r>
-              <a:rPr lang="en-US" dirty="0" err="1" smtClean="0"/>
+              <a:rPr lang="en-US" dirty="0" err="1"/>
               <a:t>TopLeft</a:t>
             </a:r>
             <a:r>
-              <a:rPr lang="en-US" dirty="0" smtClean="0"/>
+              <a:rPr lang="en-US" dirty="0"/>
               <a:t> by adding Speed</a:t>
             </a:r>
           </a:p>
@@ -11319,15 +10705,15 @@
               </a:spcBef>
             </a:pPr>
             <a:r>
-              <a:rPr lang="en-US" dirty="0" smtClean="0"/>
+              <a:rPr lang="en-US" dirty="0"/>
               <a:t>Ball – inherits </a:t>
             </a:r>
             <a:r>
-              <a:rPr lang="en-US" dirty="0" err="1" smtClean="0"/>
+              <a:rPr lang="en-US" dirty="0" err="1"/>
               <a:t>MovingObject</a:t>
             </a:r>
             <a:r>
-              <a:rPr lang="en-US" dirty="0" smtClean="0"/>
+              <a:rPr lang="en-US" dirty="0"/>
               <a:t> with bouncing behavior</a:t>
             </a:r>
           </a:p>
@@ -11341,14 +10727,14 @@
               </a:spcBef>
             </a:pPr>
             <a:r>
-              <a:rPr lang="en-US" dirty="0" smtClean="0"/>
+              <a:rPr lang="en-US" dirty="0"/>
               <a:t>Overrides </a:t>
             </a:r>
             <a:r>
-              <a:rPr lang="en-US" dirty="0" err="1" smtClean="0"/>
+              <a:rPr lang="en-US" dirty="0" err="1"/>
               <a:t>RespondToCollision</a:t>
             </a:r>
-            <a:endParaRPr lang="en-US" dirty="0" smtClean="0"/>
+            <a:endParaRPr lang="en-US" dirty="0"/>
           </a:p>
         </p:txBody>
       </p:sp>
@@ -11414,13 +10800,6 @@
     <a:masterClrMapping/>
   </p:clrMapOvr>
   <p:transition/>
-  <p:timing>
-    <p:tnLst>
-      <p:par>
-        <p:cTn id="1" dur="indefinite" restart="never" nodeType="tmRoot"/>
-      </p:par>
-    </p:tnLst>
-  </p:timing>
 </p:sld>
 </file>
 
@@ -11473,11 +10852,11 @@
               </a:lnSpc>
             </a:pPr>
             <a:r>
-              <a:rPr lang="en-US" sz="4800" dirty="0" smtClean="0"/>
+              <a:rPr lang="en-US" sz="4800" dirty="0"/>
               <a:t>The IUserInterface and </a:t>
             </a:r>
             <a:r>
-              <a:rPr lang="en-US" sz="4800" dirty="0" err="1" smtClean="0"/>
+              <a:rPr lang="en-US" sz="4800" dirty="0" err="1"/>
               <a:t>KeyboardInterface</a:t>
             </a:r>
             <a:endParaRPr lang="en-US" sz="4800" dirty="0"/>
@@ -11575,13 +10954,6 @@
     <a:masterClrMapping/>
   </p:clrMapOvr>
   <p:transition/>
-  <p:timing>
-    <p:tnLst>
-      <p:par>
-        <p:cTn id="1" dur="indefinite" restart="never" nodeType="tmRoot"/>
-      </p:par>
-    </p:tnLst>
-  </p:timing>
 </p:sld>
 </file>
 
@@ -11632,14 +11004,14 @@
               <a:defRPr/>
             </a:pPr>
             <a:r>
-              <a:rPr lang="en-US" sz="3600" dirty="0" smtClean="0"/>
+              <a:rPr lang="en-US" sz="3600" dirty="0"/>
               <a:t>IUserInterface &amp; </a:t>
             </a:r>
             <a:br>
-              <a:rPr lang="en-US" sz="3600" dirty="0" smtClean="0"/>
+              <a:rPr lang="en-US" sz="3600" dirty="0"/>
             </a:br>
             <a:r>
-              <a:rPr lang="en-US" sz="3600" dirty="0" err="1" smtClean="0"/>
+              <a:rPr lang="en-US" sz="3600" dirty="0" err="1"/>
               <a:t>KeyboardInterface</a:t>
             </a:r>
             <a:endParaRPr lang="bg-BG" sz="4000" dirty="0"/>
@@ -11678,16 +11050,8 @@
               </a:spcBef>
             </a:pPr>
             <a:r>
-              <a:rPr lang="en-US" dirty="0" smtClean="0"/>
-              <a:t>IUserInterface</a:t>
-            </a:r>
-            <a:r>
               <a:rPr lang="en-US" dirty="0"/>
-              <a:t> </a:t>
-            </a:r>
-            <a:r>
-              <a:rPr lang="en-US" dirty="0" smtClean="0"/>
-              <a:t>– provides processing of user input</a:t>
+              <a:t>IUserInterface – provides processing of user input</a:t>
             </a:r>
           </a:p>
           <a:p>
@@ -11700,11 +11064,11 @@
               </a:spcBef>
             </a:pPr>
             <a:r>
-              <a:rPr lang="en-US" dirty="0" err="1" smtClean="0"/>
+              <a:rPr lang="en-US" dirty="0" err="1"/>
               <a:t>ProcessInput</a:t>
             </a:r>
             <a:r>
-              <a:rPr lang="en-US" dirty="0" smtClean="0"/>
+              <a:rPr lang="en-US" dirty="0"/>
               <a:t> method – checks for user input and signals the appropriate events</a:t>
             </a:r>
           </a:p>
@@ -11718,23 +11082,23 @@
               </a:spcBef>
             </a:pPr>
             <a:r>
-              <a:rPr lang="en-US" dirty="0" err="1" smtClean="0"/>
+              <a:rPr lang="en-US" dirty="0" err="1"/>
               <a:t>OnActionPressed</a:t>
             </a:r>
             <a:r>
-              <a:rPr lang="en-US" dirty="0" smtClean="0"/>
+              <a:rPr lang="en-US" dirty="0"/>
               <a:t>, </a:t>
             </a:r>
             <a:r>
-              <a:rPr lang="en-US" dirty="0" err="1" smtClean="0"/>
+              <a:rPr lang="en-US" dirty="0" err="1"/>
               <a:t>OnRightPressed</a:t>
             </a:r>
             <a:r>
-              <a:rPr lang="en-US" dirty="0" smtClean="0"/>
+              <a:rPr lang="en-US" dirty="0"/>
               <a:t>, </a:t>
             </a:r>
             <a:r>
-              <a:rPr lang="en-US" dirty="0" err="1" smtClean="0"/>
+              <a:rPr lang="en-US" dirty="0" err="1"/>
               <a:t>OnLeftPressed</a:t>
             </a:r>
             <a:endParaRPr lang="en-US" dirty="0"/>
@@ -11749,7 +11113,7 @@
               </a:spcBef>
             </a:pPr>
             <a:r>
-              <a:rPr lang="en-US" dirty="0" smtClean="0"/>
+              <a:rPr lang="en-US" dirty="0"/>
               <a:t>Events for action (e.g. "shoot" ), move left and move right (e.g. joystick left or keyboard left arrow)</a:t>
             </a:r>
           </a:p>
@@ -11763,19 +11127,19 @@
               </a:spcBef>
             </a:pPr>
             <a:r>
-              <a:rPr lang="en-US" dirty="0" err="1" smtClean="0"/>
+              <a:rPr lang="en-US" dirty="0" err="1"/>
               <a:t>KeyboardInterface</a:t>
             </a:r>
             <a:r>
-              <a:rPr lang="en-US" dirty="0" smtClean="0"/>
+              <a:rPr lang="en-US" dirty="0"/>
               <a:t> – implements </a:t>
             </a:r>
             <a:r>
-              <a:rPr lang="en-US" dirty="0" err="1" smtClean="0"/>
+              <a:rPr lang="en-US" dirty="0" err="1"/>
               <a:t>IUserInterface</a:t>
             </a:r>
             <a:r>
-              <a:rPr lang="en-US" dirty="0" smtClean="0"/>
+              <a:rPr lang="en-US" dirty="0"/>
               <a:t> for keyboard interaction</a:t>
             </a:r>
           </a:p>
@@ -11843,13 +11207,6 @@
     <a:masterClrMapping/>
   </p:clrMapOvr>
   <p:transition/>
-  <p:timing>
-    <p:tnLst>
-      <p:par>
-        <p:cTn id="1" dur="indefinite" restart="never" nodeType="tmRoot"/>
-      </p:par>
-    </p:tnLst>
-  </p:timing>
 </p:sld>
 </file>
 
@@ -11902,24 +11259,23 @@
               </a:lnSpc>
             </a:pPr>
             <a:r>
-              <a:rPr lang="en-US" sz="4800" dirty="0" smtClean="0"/>
+              <a:rPr lang="en-US" sz="4800" dirty="0"/>
               <a:t>The </a:t>
             </a:r>
             <a:br>
-              <a:rPr lang="en-US" sz="4800" dirty="0" smtClean="0"/>
+              <a:rPr lang="en-US" sz="4800" dirty="0"/>
             </a:br>
             <a:r>
-              <a:rPr lang="en-US" sz="4800" dirty="0" smtClean="0"/>
+              <a:rPr lang="en-US" sz="4800" dirty="0"/>
               <a:t>Engine </a:t>
             </a:r>
             <a:br>
-              <a:rPr lang="en-US" sz="4800" dirty="0" smtClean="0"/>
+              <a:rPr lang="en-US" sz="4800" dirty="0"/>
             </a:br>
             <a:r>
-              <a:rPr lang="en-US" sz="4800" dirty="0" smtClean="0"/>
+              <a:rPr lang="en-US" sz="4800" dirty="0"/>
               <a:t>Class</a:t>
             </a:r>
-            <a:endParaRPr lang="en-US" sz="4800" dirty="0"/>
           </a:p>
         </p:txBody>
       </p:sp>
@@ -11975,13 +11331,6 @@
     <a:masterClrMapping/>
   </p:clrMapOvr>
   <p:transition/>
-  <p:timing>
-    <p:tnLst>
-      <p:par>
-        <p:cTn id="1" dur="indefinite" restart="never" nodeType="tmRoot"/>
-      </p:par>
-    </p:tnLst>
-  </p:timing>
 </p:sld>
 </file>
 
@@ -12032,7 +11381,7 @@
               <a:defRPr/>
             </a:pPr>
             <a:r>
-              <a:rPr lang="en-US" sz="3600" dirty="0" smtClean="0"/>
+              <a:rPr lang="en-US" sz="3600" dirty="0"/>
               <a:t>The Engine Class</a:t>
             </a:r>
             <a:endParaRPr lang="bg-BG" sz="4000" dirty="0"/>
@@ -12071,7 +11420,7 @@
               </a:spcBef>
             </a:pPr>
             <a:r>
-              <a:rPr lang="en-US" dirty="0" smtClean="0"/>
+              <a:rPr lang="en-US" dirty="0"/>
               <a:t>Manages game objects, user interface and visualization; all public methods are virtual</a:t>
             </a:r>
           </a:p>
@@ -12085,7 +11434,7 @@
               </a:spcBef>
             </a:pPr>
             <a:r>
-              <a:rPr lang="en-US" dirty="0" smtClean="0"/>
+              <a:rPr lang="en-US" dirty="0"/>
               <a:t>Uses a IUserInterface</a:t>
             </a:r>
           </a:p>
@@ -12099,7 +11448,7 @@
               </a:spcBef>
             </a:pPr>
             <a:r>
-              <a:rPr lang="en-US" dirty="0" smtClean="0"/>
+              <a:rPr lang="en-US" dirty="0"/>
               <a:t>Uses a IRenderer</a:t>
             </a:r>
           </a:p>
@@ -12113,7 +11462,7 @@
               </a:spcBef>
             </a:pPr>
             <a:r>
-              <a:rPr lang="en-US" dirty="0" smtClean="0"/>
+              <a:rPr lang="en-US" dirty="0"/>
               <a:t>Has several GameObject lists</a:t>
             </a:r>
           </a:p>
@@ -12127,10 +11476,10 @@
               </a:spcBef>
             </a:pPr>
             <a:r>
-              <a:rPr lang="en-US" dirty="0" err="1" smtClean="0"/>
+              <a:rPr lang="en-US" dirty="0" err="1"/>
               <a:t>allObjects</a:t>
             </a:r>
-            <a:endParaRPr lang="en-US" dirty="0" smtClean="0"/>
+            <a:endParaRPr lang="en-US" dirty="0"/>
           </a:p>
           <a:p>
             <a:pPr lvl="2">
@@ -12142,10 +11491,10 @@
               </a:spcBef>
             </a:pPr>
             <a:r>
-              <a:rPr lang="en-US" dirty="0" err="1" smtClean="0"/>
+              <a:rPr lang="en-US" dirty="0" err="1"/>
               <a:t>movingObjects</a:t>
             </a:r>
-            <a:endParaRPr lang="en-US" dirty="0" smtClean="0"/>
+            <a:endParaRPr lang="en-US" dirty="0"/>
           </a:p>
           <a:p>
             <a:pPr lvl="2">
@@ -12157,10 +11506,10 @@
               </a:spcBef>
             </a:pPr>
             <a:r>
-              <a:rPr lang="en-US" dirty="0" err="1" smtClean="0"/>
+              <a:rPr lang="en-US" dirty="0" err="1"/>
               <a:t>staticObjects</a:t>
             </a:r>
-            <a:endParaRPr lang="en-US" dirty="0" smtClean="0"/>
+            <a:endParaRPr lang="en-US" dirty="0"/>
           </a:p>
           <a:p>
             <a:pPr lvl="1">
@@ -12172,7 +11521,7 @@
               </a:spcBef>
             </a:pPr>
             <a:r>
-              <a:rPr lang="en-US" dirty="0" smtClean="0"/>
+              <a:rPr lang="en-US" dirty="0"/>
               <a:t>Has a separate Racket object</a:t>
             </a:r>
           </a:p>
@@ -12186,7 +11535,7 @@
               </a:spcBef>
             </a:pPr>
             <a:r>
-              <a:rPr lang="en-US" dirty="0" smtClean="0"/>
+              <a:rPr lang="en-US" dirty="0"/>
               <a:t>For control over the player racket</a:t>
             </a:r>
           </a:p>
@@ -12200,7 +11549,7 @@
               </a:spcBef>
             </a:pPr>
             <a:r>
-              <a:rPr lang="en-US" dirty="0" smtClean="0"/>
+              <a:rPr lang="en-US" dirty="0"/>
               <a:t>Has methods for controlling the Racket</a:t>
             </a:r>
           </a:p>
@@ -12213,7 +11562,7 @@
                 <a:spcPts val="0"/>
               </a:spcBef>
             </a:pPr>
-            <a:endParaRPr lang="en-US" dirty="0" smtClean="0"/>
+            <a:endParaRPr lang="en-US" dirty="0"/>
           </a:p>
         </p:txBody>
       </p:sp>
@@ -12279,13 +11628,6 @@
     <a:masterClrMapping/>
   </p:clrMapOvr>
   <p:transition/>
-  <p:timing>
-    <p:tnLst>
-      <p:par>
-        <p:cTn id="1" dur="indefinite" restart="never" nodeType="tmRoot"/>
-      </p:par>
-    </p:tnLst>
-  </p:timing>
 </p:sld>
 </file>
 
@@ -12322,10 +11664,9 @@
           <a:lstStyle/>
           <a:p>
             <a:r>
-              <a:rPr lang="en-US" dirty="0" smtClean="0"/>
+              <a:rPr lang="en-US" dirty="0"/>
               <a:t>Contents</a:t>
             </a:r>
-            <a:endParaRPr lang="en-US" dirty="0"/>
           </a:p>
         </p:txBody>
       </p:sp>
@@ -12357,7 +11698,7 @@
               <a:defRPr/>
             </a:pPr>
             <a:r>
-              <a:rPr lang="en-US" dirty="0" smtClean="0"/>
+              <a:rPr lang="en-US" dirty="0"/>
               <a:t>Overview</a:t>
             </a:r>
           </a:p>
@@ -12376,11 +11717,7 @@
             </a:pPr>
             <a:r>
               <a:rPr lang="en-US" dirty="0"/>
-              <a:t>The GameObject </a:t>
-            </a:r>
-            <a:r>
-              <a:rPr lang="en-US" dirty="0" smtClean="0"/>
-              <a:t>class </a:t>
+              <a:t>The GameObject class </a:t>
             </a:r>
           </a:p>
           <a:p>
@@ -12394,7 +11731,7 @@
               <a:defRPr/>
             </a:pPr>
             <a:r>
-              <a:rPr lang="en-US" dirty="0" smtClean="0"/>
+              <a:rPr lang="en-US" dirty="0"/>
               <a:t>Important members</a:t>
             </a:r>
           </a:p>
@@ -12409,23 +11746,23 @@
               <a:defRPr/>
             </a:pPr>
             <a:r>
-              <a:rPr lang="en-US" dirty="0" smtClean="0"/>
+              <a:rPr lang="en-US" dirty="0"/>
               <a:t>The </a:t>
             </a:r>
             <a:r>
-              <a:rPr lang="en-US" dirty="0" err="1" smtClean="0"/>
+              <a:rPr lang="en-US" dirty="0" err="1"/>
               <a:t>IRenderable</a:t>
             </a:r>
             <a:r>
-              <a:rPr lang="en-US" dirty="0" smtClean="0"/>
+              <a:rPr lang="en-US" dirty="0"/>
               <a:t> and </a:t>
             </a:r>
             <a:r>
-              <a:rPr lang="en-US" dirty="0" err="1" smtClean="0"/>
+              <a:rPr lang="en-US" dirty="0" err="1"/>
               <a:t>ICollidable</a:t>
             </a:r>
             <a:r>
-              <a:rPr lang="en-US" dirty="0" smtClean="0"/>
+              <a:rPr lang="en-US" dirty="0"/>
               <a:t> interfaces</a:t>
             </a:r>
           </a:p>
@@ -12444,11 +11781,7 @@
             </a:pPr>
             <a:r>
               <a:rPr lang="en-US" dirty="0"/>
-              <a:t>The Block </a:t>
-            </a:r>
-            <a:r>
-              <a:rPr lang="en-US" dirty="0" smtClean="0"/>
-              <a:t>class</a:t>
+              <a:t>The Block class</a:t>
             </a:r>
           </a:p>
           <a:p>
@@ -12469,10 +11802,10 @@
               <a:t>The IRenderer interface and </a:t>
             </a:r>
             <a:r>
-              <a:rPr lang="en-US" dirty="0" err="1" smtClean="0"/>
+              <a:rPr lang="en-US" dirty="0" err="1"/>
               <a:t>ConsoleRenderer</a:t>
             </a:r>
-            <a:endParaRPr lang="en-US" dirty="0" smtClean="0"/>
+            <a:endParaRPr lang="en-US" dirty="0"/>
           </a:p>
           <a:p>
             <a:pPr marL="446088" indent="-446088">
@@ -12492,11 +11825,11 @@
               <a:t>The </a:t>
             </a:r>
             <a:r>
-              <a:rPr lang="en-US" dirty="0" err="1" smtClean="0"/>
+              <a:rPr lang="en-US" dirty="0" err="1"/>
               <a:t>MovingObject</a:t>
             </a:r>
             <a:r>
-              <a:rPr lang="en-US" dirty="0" smtClean="0"/>
+              <a:rPr lang="en-US" dirty="0"/>
               <a:t> and Ball classes</a:t>
             </a:r>
           </a:p>
@@ -12514,14 +11847,14 @@
               <a:defRPr/>
             </a:pPr>
             <a:r>
-              <a:rPr lang="en-US" dirty="0" smtClean="0"/>
+              <a:rPr lang="en-US" dirty="0"/>
               <a:t>The IUserInterface and </a:t>
             </a:r>
             <a:r>
-              <a:rPr lang="en-US" dirty="0" err="1" smtClean="0"/>
+              <a:rPr lang="en-US" dirty="0" err="1"/>
               <a:t>KeyboardInterface</a:t>
             </a:r>
-            <a:endParaRPr lang="en-US" dirty="0" smtClean="0"/>
+            <a:endParaRPr lang="en-US" dirty="0"/>
           </a:p>
           <a:p>
             <a:pPr marL="446088" indent="-446088">
@@ -12537,7 +11870,7 @@
               <a:defRPr/>
             </a:pPr>
             <a:r>
-              <a:rPr lang="en-US" dirty="0" smtClean="0"/>
+              <a:rPr lang="en-US" dirty="0"/>
               <a:t>The Engine class</a:t>
             </a:r>
           </a:p>
@@ -12582,13 +11915,6 @@
   <p:clrMapOvr>
     <a:masterClrMapping/>
   </p:clrMapOvr>
-  <p:timing>
-    <p:tnLst>
-      <p:par>
-        <p:cTn id="1" dur="indefinite" restart="never" nodeType="tmRoot"/>
-      </p:par>
-    </p:tnLst>
-  </p:timing>
 </p:sld>
 </file>
 
@@ -12639,7 +11965,7 @@
               <a:defRPr/>
             </a:pPr>
             <a:r>
-              <a:rPr lang="en-US" sz="3600" dirty="0" smtClean="0"/>
+              <a:rPr lang="en-US" sz="3600" dirty="0"/>
               <a:t>The Engine Class (2)</a:t>
             </a:r>
             <a:endParaRPr lang="bg-BG" sz="4000" dirty="0"/>
@@ -12678,7 +12004,7 @@
               </a:spcBef>
             </a:pPr>
             <a:r>
-              <a:rPr lang="en-US" dirty="0" smtClean="0"/>
+              <a:rPr lang="en-US" dirty="0"/>
               <a:t>Important members</a:t>
             </a:r>
           </a:p>
@@ -12692,11 +12018,11 @@
               </a:spcBef>
             </a:pPr>
             <a:r>
-              <a:rPr lang="en-US" dirty="0" err="1" smtClean="0"/>
+              <a:rPr lang="en-US" dirty="0" err="1"/>
               <a:t>AddObject</a:t>
             </a:r>
             <a:r>
-              <a:rPr lang="en-US" dirty="0" smtClean="0"/>
+              <a:rPr lang="en-US" dirty="0"/>
               <a:t> method – adds a GameObject to the engine</a:t>
             </a:r>
           </a:p>
@@ -12710,7 +12036,7 @@
               </a:spcBef>
             </a:pPr>
             <a:r>
-              <a:rPr lang="en-US" dirty="0" smtClean="0"/>
+              <a:rPr lang="en-US" dirty="0"/>
               <a:t>Run method – starts a "game loop":</a:t>
             </a:r>
           </a:p>
@@ -12724,7 +12050,7 @@
               </a:spcBef>
             </a:pPr>
             <a:r>
-              <a:rPr lang="en-US" dirty="0" smtClean="0"/>
+              <a:rPr lang="en-US" dirty="0"/>
               <a:t>Draws the scene</a:t>
             </a:r>
           </a:p>
@@ -12738,7 +12064,7 @@
               </a:spcBef>
             </a:pPr>
             <a:r>
-              <a:rPr lang="en-US" dirty="0" smtClean="0"/>
+              <a:rPr lang="en-US" dirty="0"/>
               <a:t>Checks for input</a:t>
             </a:r>
           </a:p>
@@ -12752,7 +12078,7 @@
               </a:spcBef>
             </a:pPr>
             <a:r>
-              <a:rPr lang="en-US" dirty="0" smtClean="0"/>
+              <a:rPr lang="en-US" dirty="0"/>
               <a:t>Clears the rendering queue</a:t>
             </a:r>
           </a:p>
@@ -12766,7 +12092,7 @@
               </a:spcBef>
             </a:pPr>
             <a:r>
-              <a:rPr lang="en-US" dirty="0" smtClean="0"/>
+              <a:rPr lang="en-US" dirty="0"/>
               <a:t>Calls Update for all objects</a:t>
             </a:r>
           </a:p>
@@ -12780,15 +12106,15 @@
               </a:spcBef>
             </a:pPr>
             <a:r>
-              <a:rPr lang="en-US" dirty="0" smtClean="0"/>
+              <a:rPr lang="en-US" dirty="0"/>
               <a:t>Calls </a:t>
             </a:r>
             <a:r>
-              <a:rPr lang="en-US" dirty="0" err="1" smtClean="0"/>
+              <a:rPr lang="en-US" dirty="0" err="1"/>
               <a:t>ProduceObjects</a:t>
             </a:r>
             <a:r>
-              <a:rPr lang="en-US" dirty="0" smtClean="0"/>
+              <a:rPr lang="en-US" dirty="0"/>
               <a:t> for all objects and collects</a:t>
             </a:r>
           </a:p>
@@ -12802,7 +12128,7 @@
               </a:spcBef>
             </a:pPr>
             <a:r>
-              <a:rPr lang="en-US" dirty="0" smtClean="0"/>
+              <a:rPr lang="en-US" dirty="0"/>
               <a:t>Removes all destroyed objects</a:t>
             </a:r>
           </a:p>
@@ -12816,7 +12142,7 @@
               </a:spcBef>
             </a:pPr>
             <a:r>
-              <a:rPr lang="en-US" dirty="0" smtClean="0"/>
+              <a:rPr lang="en-US" dirty="0"/>
               <a:t>Adds all produced objects</a:t>
             </a:r>
           </a:p>
@@ -12829,7 +12155,7 @@
                 <a:spcPts val="0"/>
               </a:spcBef>
             </a:pPr>
-            <a:endParaRPr lang="en-US" dirty="0" smtClean="0"/>
+            <a:endParaRPr lang="en-US" dirty="0"/>
           </a:p>
         </p:txBody>
       </p:sp>
@@ -12895,13 +12221,6 @@
     <a:masterClrMapping/>
   </p:clrMapOvr>
   <p:transition/>
-  <p:timing>
-    <p:tnLst>
-      <p:par>
-        <p:cTn id="1" dur="indefinite" restart="never" nodeType="tmRoot"/>
-      </p:par>
-    </p:tnLst>
-  </p:timing>
 </p:sld>
 </file>
 
@@ -12957,10 +12276,9 @@
               <a:buNone/>
             </a:pPr>
             <a:r>
-              <a:rPr lang="en-US" sz="7200" dirty="0" smtClean="0"/>
+              <a:rPr lang="en-US" sz="7200" dirty="0"/>
               <a:t>Questions?</a:t>
             </a:r>
-            <a:endParaRPr lang="en-US" sz="7200" dirty="0"/>
           </a:p>
         </p:txBody>
       </p:sp>
@@ -13112,7 +12430,7 @@
           <a:p>
             <a:pPr algn="r"/>
             <a:r>
-              <a:rPr lang="en-US" sz="1800" b="1" dirty="0" smtClean="0">
+              <a:rPr lang="en-US" sz="1800" b="1" dirty="0">
                 <a:hlinkClick r:id="rId2"/>
               </a:rPr>
               <a:t>http://academy.telerik.com</a:t>
@@ -13142,10 +12460,9 @@
           <a:lstStyle/>
           <a:p>
             <a:r>
-              <a:rPr lang="en-US" sz="3800" dirty="0" smtClean="0"/>
+              <a:rPr lang="en-US" sz="3800" dirty="0"/>
               <a:t>Academy Popcorn API</a:t>
             </a:r>
-            <a:endParaRPr lang="en-US" sz="3800" dirty="0"/>
           </a:p>
         </p:txBody>
       </p:sp>
@@ -13159,13 +12476,6 @@
   <p:clrMapOvr>
     <a:masterClrMapping/>
   </p:clrMapOvr>
-  <p:timing>
-    <p:tnLst>
-      <p:par>
-        <p:cTn id="1" dur="indefinite" restart="never" nodeType="tmRoot"/>
-      </p:par>
-    </p:tnLst>
-  </p:timing>
 </p:sld>
 </file>
 
@@ -13212,7 +12522,7 @@
               <a:defRPr/>
             </a:pPr>
             <a:r>
-              <a:rPr lang="en-US" sz="4000" dirty="0" smtClean="0"/>
+              <a:rPr lang="en-US" sz="4000" dirty="0"/>
               <a:t>Exercises</a:t>
             </a:r>
             <a:endParaRPr lang="bg-BG" sz="4000" dirty="0"/>
@@ -13231,8 +12541,8 @@
         </p:nvSpPr>
         <p:spPr>
           <a:xfrm>
-            <a:off x="167640" y="304800"/>
-            <a:ext cx="8763000" cy="5715000"/>
+            <a:off x="167640" y="609600"/>
+            <a:ext cx="8763000" cy="5410200"/>
           </a:xfrm>
           <a:prstGeom prst="rect">
             <a:avLst/>
@@ -13254,7 +12564,7 @@
               <a:tabLst/>
             </a:pPr>
             <a:r>
-              <a:rPr lang="en-US" sz="2600" dirty="0" smtClean="0">
+              <a:rPr lang="en-US" sz="2600" dirty="0">
                 <a:solidFill>
                   <a:srgbClr val="EBFFD2"/>
                 </a:solidFill>
@@ -13262,7 +12572,7 @@
               <a:t>The </a:t>
             </a:r>
             <a:r>
-              <a:rPr lang="en-US" sz="2600" dirty="0" err="1" smtClean="0">
+              <a:rPr lang="en-US" sz="2600" dirty="0" err="1">
                 <a:solidFill>
                   <a:srgbClr val="EBFFD2"/>
                 </a:solidFill>
@@ -13270,7 +12580,7 @@
               <a:t>AcademyPopcorn</a:t>
             </a:r>
             <a:r>
-              <a:rPr lang="en-US" sz="2600" dirty="0" smtClean="0">
+              <a:rPr lang="en-US" sz="2600" dirty="0">
                 <a:solidFill>
                   <a:srgbClr val="EBFFD2"/>
                 </a:solidFill>
@@ -13278,7 +12588,7 @@
               <a:t> class contains an </a:t>
             </a:r>
             <a:r>
-              <a:rPr lang="en-US" sz="2600" dirty="0" err="1" smtClean="0">
+              <a:rPr lang="en-US" sz="2600" dirty="0" err="1">
                 <a:solidFill>
                   <a:srgbClr val="EBFFD2"/>
                 </a:solidFill>
@@ -13286,7 +12596,7 @@
               <a:t>IndestructibleBlock</a:t>
             </a:r>
             <a:r>
-              <a:rPr lang="en-US" sz="2600" dirty="0" smtClean="0">
+              <a:rPr lang="en-US" sz="2600" dirty="0">
                 <a:solidFill>
                   <a:srgbClr val="EBFFD2"/>
                 </a:solidFill>
@@ -13294,15 +12604,15 @@
               <a:t> class</a:t>
             </a:r>
             <a:r>
-              <a:rPr lang="en-US" sz="2600" dirty="0" smtClean="0"/>
+              <a:rPr lang="en-US" sz="2600" dirty="0"/>
               <a:t>. Use it to create side and ceiling walls to the game. You can ONLY edit the </a:t>
             </a:r>
             <a:r>
-              <a:rPr lang="en-US" sz="2600" dirty="0" err="1" smtClean="0"/>
+              <a:rPr lang="en-US" sz="2600" dirty="0" err="1"/>
               <a:t>AcademyPopcornMain.cs</a:t>
             </a:r>
             <a:r>
-              <a:rPr lang="en-US" sz="2600" dirty="0" smtClean="0"/>
+              <a:rPr lang="en-US" sz="2600" dirty="0"/>
               <a:t> file.</a:t>
             </a:r>
           </a:p>
@@ -13319,7 +12629,7 @@
               <a:tabLst/>
             </a:pPr>
             <a:r>
-              <a:rPr lang="en-US" sz="2600" dirty="0" smtClean="0">
+              <a:rPr lang="en-US" sz="2600" dirty="0">
                 <a:solidFill>
                   <a:srgbClr val="EBFFD2"/>
                 </a:solidFill>
@@ -13327,15 +12637,15 @@
               <a:t>The Engine class has a hardcoded sleep time (search for </a:t>
             </a:r>
             <a:r>
-              <a:rPr lang="bg-BG" sz="2600" dirty="0" smtClean="0"/>
+              <a:rPr lang="bg-BG" sz="2600" dirty="0"/>
               <a:t>"</a:t>
             </a:r>
             <a:r>
-              <a:rPr lang="en-US" sz="2600" dirty="0" err="1" smtClean="0"/>
+              <a:rPr lang="en-US" sz="2600" dirty="0" err="1"/>
               <a:t>System.Threading.Sleep</a:t>
             </a:r>
             <a:r>
-              <a:rPr lang="en-US" sz="2600" dirty="0" smtClean="0"/>
+              <a:rPr lang="en-US" sz="2600" dirty="0"/>
               <a:t>(500)". Make the sleep time a field in the Engine and implement a constructor, which takes it as an additional parameter.</a:t>
             </a:r>
           </a:p>
@@ -13352,7 +12662,7 @@
               <a:tabLst/>
             </a:pPr>
             <a:r>
-              <a:rPr lang="en-US" sz="2600" dirty="0" smtClean="0">
+              <a:rPr lang="en-US" sz="2600" dirty="0">
                 <a:solidFill>
                   <a:srgbClr val="EBFFD2"/>
                 </a:solidFill>
@@ -13360,7 +12670,7 @@
               <a:t>Search for a "TODO" in the Engine class, regarding the </a:t>
             </a:r>
             <a:r>
-              <a:rPr lang="en-US" sz="2600" dirty="0" err="1" smtClean="0">
+              <a:rPr lang="en-US" sz="2600" dirty="0" err="1">
                 <a:solidFill>
                   <a:srgbClr val="EBFFD2"/>
                 </a:solidFill>
@@ -13368,7 +12678,7 @@
               <a:t>AddRacket</a:t>
             </a:r>
             <a:r>
-              <a:rPr lang="en-US" sz="2600" dirty="0" smtClean="0">
+              <a:rPr lang="en-US" sz="2600" dirty="0">
                 <a:solidFill>
                   <a:srgbClr val="EBFFD2"/>
                 </a:solidFill>
@@ -13389,7 +12699,7 @@
               <a:tabLst/>
             </a:pPr>
             <a:r>
-              <a:rPr lang="en-US" sz="2800" dirty="0" smtClean="0">
+              <a:rPr lang="en-US" sz="2800" dirty="0">
                 <a:solidFill>
                   <a:srgbClr val="EBFFD2"/>
                 </a:solidFill>
@@ -13397,7 +12707,7 @@
               <a:t>Inherit the Engine class. Create a method </a:t>
             </a:r>
             <a:r>
-              <a:rPr lang="en-US" sz="2800" dirty="0" err="1" smtClean="0">
+              <a:rPr lang="en-US" sz="2800" dirty="0" err="1">
                 <a:solidFill>
                   <a:srgbClr val="EBFFD2"/>
                 </a:solidFill>
@@ -13405,7 +12715,7 @@
               <a:t>ShootPlayerRacket</a:t>
             </a:r>
             <a:r>
-              <a:rPr lang="en-US" sz="2800" dirty="0" smtClean="0">
+              <a:rPr lang="en-US" sz="2800" dirty="0">
                 <a:solidFill>
                   <a:srgbClr val="EBFFD2"/>
                 </a:solidFill>
@@ -13477,13 +12787,6 @@
     <a:masterClrMapping/>
   </p:clrMapOvr>
   <p:transition/>
-  <p:timing>
-    <p:tnLst>
-      <p:par>
-        <p:cTn id="1" dur="indefinite" restart="never" nodeType="tmRoot"/>
-      </p:par>
-    </p:tnLst>
-  </p:timing>
 </p:sld>
 </file>
 
@@ -13530,7 +12833,7 @@
               <a:defRPr/>
             </a:pPr>
             <a:r>
-              <a:rPr lang="en-US" sz="4000" dirty="0" smtClean="0"/>
+              <a:rPr lang="en-US" sz="4000" dirty="0"/>
               <a:t>Exercises (2)</a:t>
             </a:r>
             <a:endParaRPr lang="bg-BG" sz="4000" dirty="0"/>
@@ -13597,31 +12900,23 @@
             </a:r>
             <a:r>
               <a:rPr lang="en-US" sz="2600" dirty="0"/>
-              <a:t> should disappear after a "lifetime" amount of turns</a:t>
-            </a:r>
-            <a:r>
-              <a:rPr lang="en-US" sz="2600" dirty="0" smtClean="0"/>
-              <a:t>. You must NOT edit any existing .</a:t>
-            </a:r>
-            <a:r>
-              <a:rPr lang="en-US" sz="2600" dirty="0" err="1" smtClean="0"/>
+              <a:t> should disappear after a "lifetime" amount of turns. You must NOT edit any existing .</a:t>
+            </a:r>
+            <a:r>
+              <a:rPr lang="en-US" sz="2600" dirty="0" err="1"/>
               <a:t>cs</a:t>
             </a:r>
             <a:r>
-              <a:rPr lang="en-US" sz="2600" dirty="0" smtClean="0"/>
+              <a:rPr lang="en-US" sz="2600" dirty="0"/>
               <a:t> file. Then test the </a:t>
             </a:r>
             <a:r>
-              <a:rPr lang="en-US" sz="2600" dirty="0" err="1" smtClean="0"/>
+              <a:rPr lang="en-US" sz="2600" dirty="0" err="1"/>
               <a:t>TrailObject</a:t>
             </a:r>
             <a:r>
-              <a:rPr lang="en-US" sz="2600" dirty="0" smtClean="0"/>
-              <a:t> by adding an instance of it in the engine </a:t>
-            </a:r>
-            <a:r>
               <a:rPr lang="en-US" sz="2600" dirty="0"/>
-              <a:t>through the </a:t>
+              <a:t> by adding an instance of it in the engine through the </a:t>
             </a:r>
             <a:r>
               <a:rPr lang="en-US" sz="2600" dirty="0" err="1"/>
@@ -13629,11 +12924,7 @@
             </a:r>
             <a:r>
               <a:rPr lang="en-US" sz="2600" dirty="0"/>
-              <a:t> </a:t>
-            </a:r>
-            <a:r>
-              <a:rPr lang="en-US" sz="2600" dirty="0" smtClean="0"/>
-              <a:t>file.</a:t>
+              <a:t> file.</a:t>
             </a:r>
           </a:p>
           <a:p>
@@ -13649,28 +12940,24 @@
               <a:tabLst/>
             </a:pPr>
             <a:r>
-              <a:rPr lang="en-US" sz="2600" dirty="0" smtClean="0"/>
+              <a:rPr lang="en-US" sz="2600" dirty="0"/>
               <a:t>Implement a </a:t>
             </a:r>
             <a:r>
-              <a:rPr lang="en-US" sz="2600" dirty="0" err="1" smtClean="0"/>
+              <a:rPr lang="en-US" sz="2600" dirty="0" err="1"/>
               <a:t>MeteoriteBall</a:t>
             </a:r>
             <a:r>
-              <a:rPr lang="en-US" sz="2600" dirty="0" smtClean="0"/>
+              <a:rPr lang="en-US" sz="2600" dirty="0"/>
               <a:t>. It should inherit the Ball class and should leave a trail of </a:t>
             </a:r>
             <a:r>
-              <a:rPr lang="en-US" sz="2600" dirty="0" err="1" smtClean="0"/>
+              <a:rPr lang="en-US" sz="2600" dirty="0" err="1"/>
               <a:t>TrailObject</a:t>
             </a:r>
             <a:r>
-              <a:rPr lang="en-US" sz="2600" dirty="0" smtClean="0"/>
-              <a:t> objects. Each trail objects should last for 3 "turns". Other than that, the Meteorite ball should behave the same way as the normal </a:t>
-            </a:r>
-            <a:r>
               <a:rPr lang="en-US" sz="2600" dirty="0"/>
-              <a:t>ball. You must NOT edit any existing .</a:t>
+              <a:t> objects. Each trail objects should last for 3 "turns". Other than that, the Meteorite ball should behave the same way as the normal ball. You must NOT edit any existing .</a:t>
             </a:r>
             <a:r>
               <a:rPr lang="en-US" sz="2600" dirty="0" err="1"/>
@@ -13678,11 +12965,7 @@
             </a:r>
             <a:r>
               <a:rPr lang="en-US" sz="2600" dirty="0"/>
-              <a:t> file</a:t>
-            </a:r>
-            <a:r>
-              <a:rPr lang="en-US" sz="2600" dirty="0" smtClean="0"/>
-              <a:t>.</a:t>
+              <a:t> file.</a:t>
             </a:r>
           </a:p>
           <a:p>
@@ -13698,23 +12981,23 @@
               <a:tabLst/>
             </a:pPr>
             <a:r>
-              <a:rPr lang="en-US" sz="2600" dirty="0" smtClean="0"/>
+              <a:rPr lang="en-US" sz="2600" dirty="0"/>
               <a:t>Test the </a:t>
             </a:r>
             <a:r>
-              <a:rPr lang="en-US" sz="2600" dirty="0" err="1" smtClean="0"/>
+              <a:rPr lang="en-US" sz="2600" dirty="0" err="1"/>
               <a:t>MeteoriteBall</a:t>
             </a:r>
             <a:r>
-              <a:rPr lang="en-US" sz="2600" dirty="0" smtClean="0"/>
+              <a:rPr lang="en-US" sz="2600" dirty="0"/>
               <a:t> by replacing the normal ball in the </a:t>
             </a:r>
             <a:r>
-              <a:rPr lang="en-US" sz="2600" dirty="0" err="1" smtClean="0"/>
+              <a:rPr lang="en-US" sz="2600" dirty="0" err="1"/>
               <a:t>AcademyPopcornMain.cs</a:t>
             </a:r>
             <a:r>
-              <a:rPr lang="en-US" sz="2600" dirty="0" smtClean="0"/>
+              <a:rPr lang="en-US" sz="2600" dirty="0"/>
               <a:t> file.</a:t>
             </a:r>
           </a:p>
@@ -13727,7 +13010,7 @@
               <a:buAutoNum type="arabicPeriod" startAt="5"/>
               <a:tabLst/>
             </a:pPr>
-            <a:endParaRPr lang="en-US" sz="2600" dirty="0" smtClean="0"/>
+            <a:endParaRPr lang="en-US" sz="2600" dirty="0"/>
           </a:p>
           <a:p>
             <a:pPr marL="514350" indent="-514350">
@@ -13738,7 +13021,7 @@
               <a:buAutoNum type="arabicPeriod" startAt="5"/>
               <a:tabLst/>
             </a:pPr>
-            <a:endParaRPr lang="en-US" sz="2600" dirty="0" smtClean="0">
+            <a:endParaRPr lang="en-US" sz="2600" dirty="0">
               <a:solidFill>
                 <a:srgbClr val="EBFFD2"/>
               </a:solidFill>
@@ -13753,7 +13036,7 @@
               <a:buAutoNum type="arabicPeriod" startAt="5"/>
               <a:tabLst/>
             </a:pPr>
-            <a:endParaRPr lang="en-US" sz="2800" dirty="0" smtClean="0">
+            <a:endParaRPr lang="en-US" sz="2800" dirty="0">
               <a:solidFill>
                 <a:srgbClr val="EBFFD2"/>
               </a:solidFill>
@@ -13823,13 +13106,6 @@
     <a:masterClrMapping/>
   </p:clrMapOvr>
   <p:transition/>
-  <p:timing>
-    <p:tnLst>
-      <p:par>
-        <p:cTn id="1" dur="indefinite" restart="never" nodeType="tmRoot"/>
-      </p:par>
-    </p:tnLst>
-  </p:timing>
 </p:sld>
 </file>
 
@@ -13876,7 +13152,7 @@
               <a:defRPr/>
             </a:pPr>
             <a:r>
-              <a:rPr lang="en-US" sz="4000" dirty="0" smtClean="0"/>
+              <a:rPr lang="en-US" sz="4000" dirty="0"/>
               <a:t>Exercises (3)</a:t>
             </a:r>
             <a:endParaRPr lang="bg-BG" sz="4000" dirty="0"/>
@@ -13959,44 +13235,40 @@
             </a:r>
             <a:r>
               <a:rPr lang="en-US" sz="2600" dirty="0"/>
-              <a:t> should be </a:t>
-            </a:r>
-            <a:r>
-              <a:rPr lang="en-US" sz="2600" dirty="0" smtClean="0"/>
-              <a:t>indestructible. </a:t>
+              <a:t> should be indestructible. </a:t>
             </a:r>
             <a:br>
-              <a:rPr lang="en-US" sz="2600" dirty="0" smtClean="0"/>
+              <a:rPr lang="en-US" sz="2600" dirty="0"/>
             </a:br>
             <a:r>
-              <a:rPr lang="en-US" sz="2600" i="1" dirty="0" smtClean="0"/>
+              <a:rPr lang="en-US" sz="2600" i="1" dirty="0"/>
               <a:t>Hint: Take a look at the </a:t>
             </a:r>
             <a:r>
-              <a:rPr lang="en-US" sz="2600" i="1" dirty="0" err="1" smtClean="0"/>
+              <a:rPr lang="en-US" sz="2600" i="1" dirty="0" err="1"/>
               <a:t>RespondToCollision</a:t>
             </a:r>
             <a:r>
-              <a:rPr lang="en-US" sz="2600" i="1" dirty="0" smtClean="0"/>
+              <a:rPr lang="en-US" sz="2600" i="1" dirty="0"/>
               <a:t> method, the </a:t>
             </a:r>
             <a:r>
-              <a:rPr lang="en-US" sz="2600" i="1" dirty="0" err="1" smtClean="0"/>
+              <a:rPr lang="en-US" sz="2600" i="1" dirty="0" err="1"/>
               <a:t>GetCollisionGroupString</a:t>
             </a:r>
             <a:r>
-              <a:rPr lang="en-US" sz="2600" i="1" dirty="0" smtClean="0"/>
+              <a:rPr lang="en-US" sz="2600" i="1" dirty="0"/>
               <a:t> method and the </a:t>
             </a:r>
             <a:r>
-              <a:rPr lang="en-US" sz="2600" i="1" dirty="0" err="1" smtClean="0"/>
+              <a:rPr lang="en-US" sz="2600" i="1" dirty="0" err="1"/>
               <a:t>CollisionData</a:t>
             </a:r>
             <a:r>
-              <a:rPr lang="en-US" sz="2600" i="1" dirty="0" smtClean="0"/>
+              <a:rPr lang="en-US" sz="2600" i="1" dirty="0"/>
               <a:t> class.</a:t>
             </a:r>
-            <a:endParaRPr lang="en-US" sz="2600" i="1" dirty="0" smtClean="0">
+            <a:endParaRPr lang="en-US" sz="2600" i="1" dirty="0">
               <a:solidFill>
                 <a:srgbClr val="EBFFD2"/>
               </a:solidFill>
@@ -14015,7 +13287,7 @@
               <a:tabLst/>
             </a:pPr>
             <a:r>
-              <a:rPr lang="en-US" sz="2600" dirty="0" smtClean="0">
+              <a:rPr lang="en-US" sz="2600" dirty="0">
                 <a:solidFill>
                   <a:srgbClr val="EBFFD2"/>
                 </a:solidFill>
@@ -14023,7 +13295,7 @@
               <a:t>Test the </a:t>
             </a:r>
             <a:r>
-              <a:rPr lang="en-US" sz="2600" dirty="0" err="1" smtClean="0">
+              <a:rPr lang="en-US" sz="2600" dirty="0" err="1">
                 <a:solidFill>
                   <a:srgbClr val="EBFFD2"/>
                 </a:solidFill>
@@ -14031,7 +13303,7 @@
               <a:t>UnpassableBlock</a:t>
             </a:r>
             <a:r>
-              <a:rPr lang="en-US" sz="2600" dirty="0" smtClean="0">
+              <a:rPr lang="en-US" sz="2600" dirty="0">
                 <a:solidFill>
                   <a:srgbClr val="EBFFD2"/>
                 </a:solidFill>
@@ -14039,7 +13311,7 @@
               <a:t> and the </a:t>
             </a:r>
             <a:r>
-              <a:rPr lang="en-US" sz="2600" dirty="0" err="1" smtClean="0">
+              <a:rPr lang="en-US" sz="2600" dirty="0" err="1">
                 <a:solidFill>
                   <a:srgbClr val="EBFFD2"/>
                 </a:solidFill>
@@ -14047,7 +13319,7 @@
               <a:t>UnstoppableBall</a:t>
             </a:r>
             <a:r>
-              <a:rPr lang="en-US" sz="2600" dirty="0" smtClean="0">
+              <a:rPr lang="en-US" sz="2600" dirty="0">
                 <a:solidFill>
                   <a:srgbClr val="EBFFD2"/>
                 </a:solidFill>
@@ -14055,7 +13327,7 @@
               <a:t> by adding them to the engine in </a:t>
             </a:r>
             <a:r>
-              <a:rPr lang="en-US" sz="2600" dirty="0" err="1" smtClean="0">
+              <a:rPr lang="en-US" sz="2600" dirty="0" err="1">
                 <a:solidFill>
                   <a:srgbClr val="EBFFD2"/>
                 </a:solidFill>
@@ -14063,7 +13335,7 @@
               <a:t>AcademyPopcornMain.cs</a:t>
             </a:r>
             <a:r>
-              <a:rPr lang="en-US" sz="2600" dirty="0" smtClean="0">
+              <a:rPr lang="en-US" sz="2600" dirty="0">
                 <a:solidFill>
                   <a:srgbClr val="EBFFD2"/>
                 </a:solidFill>
@@ -14084,7 +13356,7 @@
               <a:tabLst/>
             </a:pPr>
             <a:r>
-              <a:rPr lang="en-US" sz="2600" dirty="0" smtClean="0">
+              <a:rPr lang="en-US" sz="2600" dirty="0">
                 <a:solidFill>
                   <a:srgbClr val="EBFFD2"/>
                 </a:solidFill>
@@ -14092,7 +13364,7 @@
               <a:t>Implement an </a:t>
             </a:r>
             <a:r>
-              <a:rPr lang="en-US" sz="2600" dirty="0" err="1" smtClean="0">
+              <a:rPr lang="en-US" sz="2600" dirty="0" err="1">
                 <a:solidFill>
                   <a:srgbClr val="EBFFD2"/>
                 </a:solidFill>
@@ -14100,7 +13372,7 @@
               <a:t>ExplodingBlock</a:t>
             </a:r>
             <a:r>
-              <a:rPr lang="en-US" sz="2600" dirty="0" smtClean="0">
+              <a:rPr lang="en-US" sz="2600" dirty="0">
                 <a:solidFill>
                   <a:srgbClr val="EBFFD2"/>
                 </a:solidFill>
@@ -14108,7 +13380,7 @@
               <a:t>. It should destroy all blocks around it when it is destroyed. You must NOT edit any existing .</a:t>
             </a:r>
             <a:r>
-              <a:rPr lang="en-US" sz="2600" dirty="0" err="1" smtClean="0">
+              <a:rPr lang="en-US" sz="2600" dirty="0" err="1">
                 <a:solidFill>
                   <a:srgbClr val="EBFFD2"/>
                 </a:solidFill>
@@ -14116,7 +13388,7 @@
               <a:t>cs</a:t>
             </a:r>
             <a:r>
-              <a:rPr lang="en-US" sz="2600" dirty="0" smtClean="0">
+              <a:rPr lang="en-US" sz="2600" dirty="0">
                 <a:solidFill>
                   <a:srgbClr val="EBFFD2"/>
                 </a:solidFill>
@@ -14124,14 +13396,14 @@
               <a:t> file. </a:t>
             </a:r>
             <a:br>
-              <a:rPr lang="en-US" sz="2600" dirty="0" smtClean="0">
+              <a:rPr lang="en-US" sz="2600" dirty="0">
                 <a:solidFill>
                   <a:srgbClr val="EBFFD2"/>
                 </a:solidFill>
               </a:rPr>
             </a:br>
             <a:r>
-              <a:rPr lang="en-US" sz="2600" i="1" dirty="0" smtClean="0">
+              <a:rPr lang="en-US" sz="2600" i="1" dirty="0">
                 <a:solidFill>
                   <a:srgbClr val="EBFFD2"/>
                 </a:solidFill>
@@ -14151,7 +13423,7 @@
               <a:buAutoNum type="arabicPeriod" startAt="8"/>
               <a:tabLst/>
             </a:pPr>
-            <a:endParaRPr lang="en-US" sz="2800" dirty="0" smtClean="0">
+            <a:endParaRPr lang="en-US" sz="2800" dirty="0">
               <a:solidFill>
                 <a:srgbClr val="EBFFD2"/>
               </a:solidFill>
@@ -14221,13 +13493,6 @@
     <a:masterClrMapping/>
   </p:clrMapOvr>
   <p:transition/>
-  <p:timing>
-    <p:tnLst>
-      <p:par>
-        <p:cTn id="1" dur="indefinite" restart="never" nodeType="tmRoot"/>
-      </p:par>
-    </p:tnLst>
-  </p:timing>
 </p:sld>
 </file>
 
@@ -14274,7 +13539,7 @@
               <a:defRPr/>
             </a:pPr>
             <a:r>
-              <a:rPr lang="en-US" sz="4000" dirty="0" smtClean="0"/>
+              <a:rPr lang="en-US" sz="4000" dirty="0"/>
               <a:t>Exercises (4)</a:t>
             </a:r>
             <a:endParaRPr lang="bg-BG" sz="4000" dirty="0"/>
@@ -14316,12 +13581,8 @@
               <a:tabLst/>
             </a:pPr>
             <a:r>
-              <a:rPr lang="en-US" sz="2600" dirty="0" smtClean="0"/>
-              <a:t>Implement a Gift class. It should be a moving object, which always falls down. The gift shouldn't collide with any ball, but should collide (and be destroyed) with the racket. </a:t>
-            </a:r>
-            <a:r>
               <a:rPr lang="en-US" sz="2600" dirty="0"/>
-              <a:t>You must NOT edit any existing .</a:t>
+              <a:t>Implement a Gift class. It should be a moving object, which always falls down. The gift shouldn't collide with any ball, but should collide (and be destroyed) with the racket. You must NOT edit any existing .</a:t>
             </a:r>
             <a:r>
               <a:rPr lang="en-US" sz="2600" dirty="0" err="1"/>
@@ -14329,11 +13590,7 @@
             </a:r>
             <a:r>
               <a:rPr lang="en-US" sz="2600" dirty="0"/>
-              <a:t> </a:t>
-            </a:r>
-            <a:r>
-              <a:rPr lang="en-US" sz="2600" dirty="0" smtClean="0"/>
-              <a:t>file. </a:t>
+              <a:t> file. </a:t>
             </a:r>
           </a:p>
           <a:p>
@@ -14349,20 +13606,16 @@
               <a:tabLst/>
             </a:pPr>
             <a:r>
-              <a:rPr lang="en-US" sz="2600" dirty="0" smtClean="0"/>
+              <a:rPr lang="en-US" sz="2600" dirty="0"/>
               <a:t>Implement a </a:t>
             </a:r>
             <a:r>
-              <a:rPr lang="en-US" sz="2600" dirty="0" err="1" smtClean="0"/>
+              <a:rPr lang="en-US" sz="2600" dirty="0" err="1"/>
               <a:t>GiftBlock</a:t>
             </a:r>
             <a:r>
-              <a:rPr lang="en-US" sz="2600" dirty="0" smtClean="0"/>
-              <a:t> class. It should be a block, which "drops" a Gift object when it is destroyed. </a:t>
-            </a:r>
-            <a:r>
               <a:rPr lang="en-US" sz="2600" dirty="0"/>
-              <a:t>You must NOT edit any existing .</a:t>
+              <a:t> class. It should be a block, which "drops" a Gift object when it is destroyed. You must NOT edit any existing .</a:t>
             </a:r>
             <a:r>
               <a:rPr lang="en-US" sz="2600" dirty="0" err="1"/>
@@ -14370,26 +13623,22 @@
             </a:r>
             <a:r>
               <a:rPr lang="en-US" sz="2600" dirty="0"/>
-              <a:t> </a:t>
-            </a:r>
-            <a:r>
-              <a:rPr lang="en-US" sz="2600" dirty="0" smtClean="0"/>
-              <a:t>file. Test the Gift and </a:t>
-            </a:r>
-            <a:r>
-              <a:rPr lang="en-US" sz="2600" dirty="0" err="1" smtClean="0"/>
+              <a:t> file. Test the Gift and </a:t>
+            </a:r>
+            <a:r>
+              <a:rPr lang="en-US" sz="2600" dirty="0" err="1"/>
               <a:t>GiftBlock</a:t>
             </a:r>
             <a:r>
-              <a:rPr lang="en-US" sz="2600" dirty="0" smtClean="0"/>
+              <a:rPr lang="en-US" sz="2600" dirty="0"/>
               <a:t> classes by adding them through the </a:t>
             </a:r>
             <a:r>
-              <a:rPr lang="en-US" sz="2600" dirty="0" err="1" smtClean="0"/>
+              <a:rPr lang="en-US" sz="2600" dirty="0" err="1"/>
               <a:t>AcademyPopcornMain.cs</a:t>
             </a:r>
             <a:r>
-              <a:rPr lang="en-US" sz="2600" dirty="0" smtClean="0"/>
+              <a:rPr lang="en-US" sz="2600" dirty="0"/>
               <a:t> file.</a:t>
             </a:r>
           </a:p>
@@ -14471,13 +13720,6 @@
     <a:masterClrMapping/>
   </p:clrMapOvr>
   <p:transition/>
-  <p:timing>
-    <p:tnLst>
-      <p:par>
-        <p:cTn id="1" dur="indefinite" restart="never" nodeType="tmRoot"/>
-      </p:par>
-    </p:tnLst>
-  </p:timing>
 </p:sld>
 </file>
 
@@ -14524,7 +13766,7 @@
               <a:defRPr/>
             </a:pPr>
             <a:r>
-              <a:rPr lang="en-US" sz="4000" dirty="0" smtClean="0"/>
+              <a:rPr lang="en-US" sz="4000" dirty="0"/>
               <a:t>Exercises (5)</a:t>
             </a:r>
             <a:endParaRPr lang="bg-BG" sz="4000" dirty="0"/>
@@ -14566,73 +13808,61 @@
               <a:tabLst/>
             </a:pPr>
             <a:r>
-              <a:rPr lang="en-US" sz="2600" dirty="0" smtClean="0"/>
-              <a:t>Implement </a:t>
-            </a:r>
-            <a:r>
               <a:rPr lang="en-US" sz="2600" dirty="0"/>
-              <a:t>a shoot ability for the player racket. The ability should only be activated when a Gift object falls on the racket. The shot objects should be a new class (e.g. Bullet) and should destroy normal Block objects (and be destroyed on collision with any block). </a:t>
+              <a:t>Implement a shoot ability for the player racket. The ability should only be activated when a Gift object falls on the racket. The shot objects should be a new class (e.g. Bullet) and should destroy normal Block objects (and be destroyed on collision with any block). </a:t>
             </a:r>
             <a:br>
               <a:rPr lang="en-US" sz="2600" dirty="0"/>
             </a:br>
             <a:r>
-              <a:rPr lang="en-US" sz="2600" dirty="0" smtClean="0"/>
+              <a:rPr lang="en-US" sz="2600" dirty="0"/>
               <a:t>Use the engine and </a:t>
             </a:r>
             <a:r>
-              <a:rPr lang="en-US" sz="2600" dirty="0" err="1" smtClean="0"/>
+              <a:rPr lang="en-US" sz="2600" dirty="0" err="1"/>
               <a:t>ShootPlayerRacket</a:t>
             </a:r>
             <a:r>
-              <a:rPr lang="en-US" sz="2600" dirty="0" smtClean="0"/>
-              <a:t> method you implemented in </a:t>
-            </a:r>
-            <a:r>
               <a:rPr lang="en-US" sz="2600" dirty="0"/>
-              <a:t>t</a:t>
-            </a:r>
-            <a:r>
-              <a:rPr lang="en-US" sz="2600" dirty="0" smtClean="0"/>
-              <a:t>ask 4, but don't add items in any of the engine lists through the </a:t>
-            </a:r>
-            <a:r>
-              <a:rPr lang="en-US" sz="2600" dirty="0" err="1" smtClean="0"/>
+              <a:t> method you implemented in task 4, but don't add items in any of the engine lists through the </a:t>
+            </a:r>
+            <a:r>
+              <a:rPr lang="en-US" sz="2600" dirty="0" err="1"/>
               <a:t>ShootPlayerRacket</a:t>
             </a:r>
             <a:r>
-              <a:rPr lang="en-US" sz="2600" dirty="0" smtClean="0"/>
+              <a:rPr lang="en-US" sz="2600" dirty="0"/>
               <a:t> method. Also don't edit the </a:t>
             </a:r>
             <a:r>
-              <a:rPr lang="en-US" sz="2600" dirty="0" err="1" smtClean="0"/>
+              <a:rPr lang="en-US" sz="2600" dirty="0" err="1"/>
               <a:t>Racket.cs</a:t>
             </a:r>
             <a:r>
-              <a:rPr lang="en-US" sz="2600" dirty="0" smtClean="0"/>
+              <a:rPr lang="en-US" sz="2600" dirty="0"/>
               <a:t> file. </a:t>
             </a:r>
             <a:br>
-              <a:rPr lang="en-US" sz="2600" dirty="0" smtClean="0"/>
+              <a:rPr lang="en-US" sz="2600" dirty="0"/>
             </a:br>
             <a:r>
-              <a:rPr lang="en-US" sz="2600" i="1" dirty="0" smtClean="0"/>
+              <a:rPr lang="en-US" sz="2600" i="1" dirty="0"/>
               <a:t>Hint: you should have a </a:t>
             </a:r>
             <a:r>
-              <a:rPr lang="en-US" sz="2600" i="1" dirty="0" err="1" smtClean="0"/>
+              <a:rPr lang="en-US" sz="2600" i="1" dirty="0" err="1"/>
               <a:t>ShootingRacket</a:t>
             </a:r>
             <a:r>
-              <a:rPr lang="en-US" sz="2600" i="1" dirty="0" smtClean="0"/>
+              <a:rPr lang="en-US" sz="2600" i="1" dirty="0"/>
               <a:t> class and override its </a:t>
             </a:r>
             <a:r>
-              <a:rPr lang="en-US" sz="2600" i="1" dirty="0" err="1" smtClean="0"/>
+              <a:rPr lang="en-US" sz="2600" i="1" dirty="0" err="1"/>
               <a:t>ProduceObjects</a:t>
             </a:r>
             <a:r>
-              <a:rPr lang="en-US" sz="2600" i="1" dirty="0" smtClean="0"/>
+              <a:rPr lang="en-US" sz="2600" i="1" dirty="0"/>
               <a:t> method.</a:t>
             </a:r>
           </a:p>
@@ -14714,13 +13944,6 @@
     <a:masterClrMapping/>
   </p:clrMapOvr>
   <p:transition/>
-  <p:timing>
-    <p:tnLst>
-      <p:par>
-        <p:cTn id="1" dur="indefinite" restart="never" nodeType="tmRoot"/>
-      </p:par>
-    </p:tnLst>
-  </p:timing>
 </p:sld>
 </file>
 
@@ -14757,7 +13980,7 @@
           <a:lstStyle/>
           <a:p>
             <a:r>
-              <a:rPr lang="en-US" smtClean="0"/>
+              <a:rPr lang="en-US"/>
               <a:t>Exercises (6)</a:t>
             </a:r>
             <a:endParaRPr lang="en-US" dirty="0"/>
@@ -14790,7 +14013,7 @@
               <a:tabLst/>
             </a:pPr>
             <a:r>
-              <a:rPr lang="en-US" dirty="0" smtClean="0">
+              <a:rPr lang="en-US" dirty="0">
                 <a:solidFill>
                   <a:schemeClr val="tx1">
                     <a:lumMod val="40000"/>
@@ -14801,7 +14024,7 @@
               <a:t>*</a:t>
             </a:r>
             <a:r>
-              <a:rPr lang="en-US" sz="2800" dirty="0" smtClean="0">
+              <a:rPr lang="en-US" sz="2800" dirty="0">
                 <a:solidFill>
                   <a:schemeClr val="tx1">
                     <a:lumMod val="40000"/>
@@ -14812,7 +14035,7 @@
               <a:t> Bonus task (optional): Download </a:t>
             </a:r>
             <a:r>
-              <a:rPr lang="en-US" sz="2800" dirty="0" err="1" smtClean="0">
+              <a:rPr lang="en-US" sz="2800" dirty="0" err="1">
                 <a:solidFill>
                   <a:schemeClr val="tx1">
                     <a:lumMod val="40000"/>
@@ -14823,7 +14046,7 @@
               <a:t>JustBelot</a:t>
             </a:r>
             <a:r>
-              <a:rPr lang="en-US" sz="2800" dirty="0" smtClean="0">
+              <a:rPr lang="en-US" sz="2800" dirty="0">
                 <a:solidFill>
                   <a:schemeClr val="tx1">
                     <a:lumMod val="40000"/>
@@ -14831,7 +14054,7 @@
                   </a:schemeClr>
                 </a:solidFill>
               </a:rPr>
-              <a:t> game source </a:t>
+              <a:t> game source from </a:t>
             </a:r>
             <a:r>
               <a:rPr lang="en-US" sz="2800" dirty="0">
@@ -14841,8 +14064,9 @@
                     <a:lumOff val="60000"/>
                   </a:schemeClr>
                 </a:solidFill>
+                <a:hlinkClick r:id="rId2"/>
               </a:rPr>
-              <a:t>from </a:t>
+              <a:t>https://github.com/NikolayIT/JustBelot</a:t>
             </a:r>
             <a:r>
               <a:rPr lang="en-US" sz="2800" dirty="0">
@@ -14852,43 +14076,8 @@
                     <a:lumOff val="60000"/>
                   </a:schemeClr>
                 </a:solidFill>
-                <a:hlinkClick r:id="rId2"/>
               </a:rPr>
-              <a:t>https://</a:t>
-            </a:r>
-            <a:r>
-              <a:rPr lang="en-US" sz="2800" dirty="0" smtClean="0">
-                <a:solidFill>
-                  <a:schemeClr val="tx1">
-                    <a:lumMod val="40000"/>
-                    <a:lumOff val="60000"/>
-                  </a:schemeClr>
-                </a:solidFill>
-                <a:hlinkClick r:id="rId2"/>
-              </a:rPr>
-              <a:t>github.com/NikolayIT/JustBelot</a:t>
-            </a:r>
-            <a:r>
-              <a:rPr lang="en-US" sz="2800" dirty="0">
-                <a:solidFill>
-                  <a:schemeClr val="tx1">
-                    <a:lumMod val="40000"/>
-                    <a:lumOff val="60000"/>
-                  </a:schemeClr>
-                </a:solidFill>
-              </a:rPr>
-              <a:t> </a:t>
-            </a:r>
-            <a:r>
-              <a:rPr lang="en-US" sz="2800" dirty="0" smtClean="0">
-                <a:solidFill>
-                  <a:schemeClr val="tx1">
-                    <a:lumMod val="40000"/>
-                    <a:lumOff val="60000"/>
-                  </a:schemeClr>
-                </a:solidFill>
-              </a:rPr>
-              <a:t>(code commits are made often so be sure to always work on the latest game source). Write your own C# library called </a:t>
+              <a:t> (code commits are made often so be sure to always work on the latest game source). Write your own C# library called </a:t>
             </a:r>
             <a:r>
               <a:rPr lang="en-US" sz="2800" dirty="0" err="1">
@@ -14911,7 +14100,7 @@
               <a:t>JustBelot.AI.YourBotName</a:t>
             </a:r>
             <a:r>
-              <a:rPr lang="en-US" sz="2800" dirty="0" smtClean="0">
+              <a:rPr lang="en-US" sz="2800" dirty="0">
                 <a:solidFill>
                   <a:schemeClr val="tx1">
                     <a:lumMod val="40000"/>
@@ -14919,18 +14108,7 @@
                   </a:schemeClr>
                 </a:solidFill>
               </a:rPr>
-              <a:t> and write a class in it that </a:t>
-            </a:r>
-            <a:r>
-              <a:rPr lang="en-US" sz="2800" dirty="0">
-                <a:solidFill>
-                  <a:schemeClr val="tx1">
-                    <a:lumMod val="40000"/>
-                    <a:lumOff val="60000"/>
-                  </a:schemeClr>
-                </a:solidFill>
-              </a:rPr>
-              <a:t>implements </a:t>
+              <a:t> and write a class in it that implements </a:t>
             </a:r>
             <a:r>
               <a:rPr lang="en-US" sz="2800" dirty="0" err="1">
@@ -14953,7 +14131,7 @@
               <a:t>JustBelot.Common.IPlayer</a:t>
             </a:r>
             <a:r>
-              <a:rPr lang="en-US" sz="2800" dirty="0" smtClean="0">
+              <a:rPr lang="en-US" sz="2800" dirty="0">
                 <a:solidFill>
                   <a:schemeClr val="tx1">
                     <a:lumMod val="40000"/>
@@ -14964,7 +14142,7 @@
               <a:t> interface.</a:t>
             </a:r>
             <a:br>
-              <a:rPr lang="en-US" sz="2800" dirty="0" smtClean="0">
+              <a:rPr lang="en-US" sz="2800" dirty="0">
                 <a:solidFill>
                   <a:schemeClr val="tx1">
                     <a:lumMod val="40000"/>
@@ -14974,7 +14152,7 @@
               </a:rPr>
             </a:br>
             <a:r>
-              <a:rPr lang="en-US" sz="2800" dirty="0" smtClean="0">
+              <a:rPr lang="en-US" sz="2800" dirty="0">
                 <a:solidFill>
                   <a:schemeClr val="tx1">
                     <a:lumMod val="40000"/>
@@ -14985,7 +14163,7 @@
               <a:t>Implement your own AI </a:t>
             </a:r>
             <a:r>
-              <a:rPr lang="en-US" sz="2800" dirty="0" err="1" smtClean="0">
+              <a:rPr lang="en-US" sz="2800" dirty="0" err="1">
                 <a:solidFill>
                   <a:schemeClr val="tx1">
                     <a:lumMod val="40000"/>
@@ -14996,7 +14174,7 @@
               <a:t>belot</a:t>
             </a:r>
             <a:r>
-              <a:rPr lang="en-US" sz="2800" dirty="0" smtClean="0">
+              <a:rPr lang="en-US" sz="2800" dirty="0">
                 <a:solidFill>
                   <a:schemeClr val="tx1">
                     <a:lumMod val="40000"/>
@@ -15007,7 +14185,7 @@
               <a:t> player that will fight with other AI players. The winner will be awarded. Please send your players to </a:t>
             </a:r>
             <a:r>
-              <a:rPr lang="en-US" sz="2800" dirty="0" smtClean="0">
+              <a:rPr lang="en-US" sz="2800" dirty="0">
                 <a:solidFill>
                   <a:schemeClr val="tx1">
                     <a:lumMod val="40000"/>
@@ -15019,7 +14197,7 @@
               <a:t>academy@telerik.com</a:t>
             </a:r>
             <a:r>
-              <a:rPr lang="en-US" sz="2800" dirty="0" smtClean="0">
+              <a:rPr lang="en-US" sz="2800" dirty="0">
                 <a:solidFill>
                   <a:schemeClr val="tx1">
                     <a:lumMod val="40000"/>
@@ -15030,7 +14208,7 @@
               <a:t> and add them in the homework archive when you upload it. You are allowed to work in teams.</a:t>
             </a:r>
             <a:br>
-              <a:rPr lang="en-US" sz="2800" dirty="0" smtClean="0">
+              <a:rPr lang="en-US" sz="2800" dirty="0">
                 <a:solidFill>
                   <a:schemeClr val="tx1">
                     <a:lumMod val="40000"/>
@@ -15040,7 +14218,7 @@
               </a:rPr>
             </a:br>
             <a:r>
-              <a:rPr lang="en-US" sz="2800" dirty="0" smtClean="0">
+              <a:rPr lang="en-US" sz="2800" dirty="0">
                 <a:solidFill>
                   <a:schemeClr val="tx1">
                     <a:lumMod val="40000"/>
@@ -15051,7 +14229,7 @@
               <a:t>This task is not obligatory. Discussions: </a:t>
             </a:r>
             <a:r>
-              <a:rPr lang="en-US" sz="2800" dirty="0" smtClean="0">
+              <a:rPr lang="en-US" sz="2800" dirty="0">
                 <a:solidFill>
                   <a:schemeClr val="tx1">
                     <a:lumMod val="40000"/>
@@ -15063,7 +14241,7 @@
               <a:t>here</a:t>
             </a:r>
             <a:r>
-              <a:rPr lang="en-US" sz="2800" dirty="0" smtClean="0">
+              <a:rPr lang="en-US" sz="2800" dirty="0">
                 <a:solidFill>
                   <a:schemeClr val="tx1">
                     <a:lumMod val="40000"/>
@@ -15073,7 +14251,7 @@
               </a:rPr>
               <a:t>.</a:t>
             </a:r>
-            <a:endParaRPr lang="en-US" sz="2800" dirty="0" smtClean="0"/>
+            <a:endParaRPr lang="en-US" sz="2800" dirty="0"/>
           </a:p>
         </p:txBody>
       </p:sp>
@@ -15116,13 +14294,6 @@
   <p:clrMapOvr>
     <a:masterClrMapping/>
   </p:clrMapOvr>
-  <p:timing>
-    <p:tnLst>
-      <p:par>
-        <p:cTn id="1" dur="indefinite" restart="never" nodeType="tmRoot"/>
-      </p:par>
-    </p:tnLst>
-  </p:timing>
 </p:sld>
 </file>
 
@@ -15175,7 +14346,7 @@
               </a:lnSpc>
             </a:pPr>
             <a:r>
-              <a:rPr lang="en-US" sz="5400" dirty="0" smtClean="0">
+              <a:rPr lang="en-US" sz="5400" dirty="0">
                 <a:solidFill>
                   <a:srgbClr val="CCFF33"/>
                 </a:solidFill>
@@ -15458,10 +14629,9 @@
               <a:buNone/>
             </a:pPr>
             <a:r>
-              <a:rPr lang="en-US" dirty="0" smtClean="0"/>
+              <a:rPr lang="en-US" dirty="0"/>
               <a:t>Overview</a:t>
             </a:r>
-            <a:endParaRPr lang="en-US" dirty="0"/>
           </a:p>
         </p:txBody>
       </p:sp>
@@ -15476,13 +14646,6 @@
     <a:masterClrMapping/>
   </p:clrMapOvr>
   <p:transition/>
-  <p:timing>
-    <p:tnLst>
-      <p:par>
-        <p:cTn id="1" dur="indefinite" restart="never" nodeType="tmRoot"/>
-      </p:par>
-    </p:tnLst>
-  </p:timing>
 </p:sld>
 </file>
 
@@ -15529,7 +14692,7 @@
               <a:defRPr/>
             </a:pPr>
             <a:r>
-              <a:rPr lang="en-US" sz="4000" dirty="0" smtClean="0"/>
+              <a:rPr lang="en-US" sz="4000" dirty="0"/>
               <a:t>Academy Popcorn API</a:t>
             </a:r>
             <a:endParaRPr lang="bg-BG" sz="4000" dirty="0"/>
@@ -15616,7 +14779,7 @@
               </a:lnSpc>
             </a:pPr>
             <a:r>
-              <a:rPr lang="en-US" dirty="0" smtClean="0">
+              <a:rPr lang="en-US" dirty="0">
                 <a:solidFill>
                   <a:schemeClr val="tx1">
                     <a:lumMod val="40000"/>
@@ -15634,7 +14797,7 @@
               </a:lnSpc>
             </a:pPr>
             <a:r>
-              <a:rPr lang="en-US" dirty="0" smtClean="0">
+              <a:rPr lang="en-US" dirty="0">
                 <a:solidFill>
                   <a:schemeClr val="tx1">
                     <a:lumMod val="40000"/>
@@ -15655,15 +14818,15 @@
               </a:spcBef>
             </a:pPr>
             <a:r>
-              <a:rPr lang="en-US" dirty="0" smtClean="0"/>
+              <a:rPr lang="en-US" dirty="0"/>
               <a:t>GameObject – base class for objects in the game (like </a:t>
             </a:r>
             <a:r>
-              <a:rPr lang="en-US" dirty="0" err="1" smtClean="0"/>
+              <a:rPr lang="en-US" dirty="0" err="1"/>
               <a:t>System.Object</a:t>
             </a:r>
             <a:r>
-              <a:rPr lang="en-US" dirty="0" smtClean="0"/>
+              <a:rPr lang="en-US" dirty="0"/>
               <a:t> in C#)</a:t>
             </a:r>
           </a:p>
@@ -15677,7 +14840,7 @@
               </a:spcBef>
             </a:pPr>
             <a:r>
-              <a:rPr lang="en-US" dirty="0" smtClean="0"/>
+              <a:rPr lang="en-US" dirty="0"/>
               <a:t>IRenderer – interface for rendering objects</a:t>
             </a:r>
           </a:p>
@@ -15691,7 +14854,7 @@
               </a:spcBef>
             </a:pPr>
             <a:r>
-              <a:rPr lang="en-US" dirty="0" smtClean="0">
+              <a:rPr lang="en-US" dirty="0">
                 <a:solidFill>
                   <a:schemeClr val="tx1">
                     <a:lumMod val="40000"/>
@@ -15712,10 +14875,10 @@
               </a:spcBef>
             </a:pPr>
             <a:r>
-              <a:rPr lang="en-US" dirty="0" smtClean="0"/>
+              <a:rPr lang="en-US" dirty="0"/>
               <a:t>Engine – runs the game, checks for input and renders the scene</a:t>
             </a:r>
-            <a:endParaRPr lang="en-US" dirty="0" smtClean="0">
+            <a:endParaRPr lang="en-US" dirty="0">
               <a:solidFill>
                 <a:srgbClr val="46A6BD">
                   <a:lumMod val="20000"/>
@@ -15734,20 +14897,12 @@
               </a:spcBef>
             </a:pPr>
             <a:r>
-              <a:rPr lang="en-US" dirty="0" err="1" smtClean="0"/>
+              <a:rPr lang="en-US" dirty="0" err="1"/>
               <a:t>CollisionDispatcher</a:t>
             </a:r>
             <a:r>
-              <a:rPr lang="en-US" dirty="0" smtClean="0"/>
-              <a:t> </a:t>
-            </a:r>
-            <a:r>
               <a:rPr lang="en-US" dirty="0"/>
-              <a:t>– </a:t>
-            </a:r>
-            <a:r>
-              <a:rPr lang="en-US" dirty="0" smtClean="0"/>
-              <a:t>notifies objects of their collisions</a:t>
+              <a:t> – notifies objects of their collisions</a:t>
             </a:r>
             <a:endParaRPr lang="en-US" dirty="0">
               <a:solidFill>
@@ -15771,13 +14926,6 @@
     <a:masterClrMapping/>
   </p:clrMapOvr>
   <p:transition/>
-  <p:timing>
-    <p:tnLst>
-      <p:par>
-        <p:cTn id="1" dur="indefinite" restart="never" nodeType="tmRoot"/>
-      </p:par>
-    </p:tnLst>
-  </p:timing>
 </p:sld>
 </file>
 
@@ -15830,7 +14978,7 @@
               </a:lnSpc>
             </a:pPr>
             <a:r>
-              <a:rPr lang="en-US" sz="5400" dirty="0" smtClean="0">
+              <a:rPr lang="en-US" sz="5400" dirty="0">
                 <a:solidFill>
                   <a:srgbClr val="CCFF33"/>
                 </a:solidFill>
@@ -16154,10 +15302,9 @@
               <a:buNone/>
             </a:pPr>
             <a:r>
-              <a:rPr lang="en-US" dirty="0" smtClean="0"/>
+              <a:rPr lang="en-US" dirty="0"/>
               <a:t>Class Diagram</a:t>
             </a:r>
-            <a:endParaRPr lang="en-US" dirty="0"/>
           </a:p>
         </p:txBody>
       </p:sp>
@@ -16172,13 +15319,6 @@
     <a:masterClrMapping/>
   </p:clrMapOvr>
   <p:transition/>
-  <p:timing>
-    <p:tnLst>
-      <p:par>
-        <p:cTn id="1" dur="indefinite" restart="never" nodeType="tmRoot"/>
-      </p:par>
-    </p:tnLst>
-  </p:timing>
 </p:sld>
 </file>
 
@@ -16231,10 +15371,9 @@
               </a:lnSpc>
             </a:pPr>
             <a:r>
-              <a:rPr lang="en-US" sz="4800" dirty="0" smtClean="0"/>
+              <a:rPr lang="en-US" sz="4800" dirty="0"/>
               <a:t>The GameObject class</a:t>
             </a:r>
-            <a:endParaRPr lang="en-US" sz="4800" dirty="0"/>
           </a:p>
         </p:txBody>
       </p:sp>
@@ -16555,13 +15694,6 @@
     <a:masterClrMapping/>
   </p:clrMapOvr>
   <p:transition/>
-  <p:timing>
-    <p:tnLst>
-      <p:par>
-        <p:cTn id="1" dur="indefinite" restart="never" nodeType="tmRoot"/>
-      </p:par>
-    </p:tnLst>
-  </p:timing>
 </p:sld>
 </file>
 
@@ -16608,7 +15740,7 @@
               <a:defRPr/>
             </a:pPr>
             <a:r>
-              <a:rPr lang="en-US" sz="4000" dirty="0" smtClean="0"/>
+              <a:rPr lang="en-US" sz="4000" dirty="0"/>
               <a:t>The GameObject class</a:t>
             </a:r>
             <a:endParaRPr lang="bg-BG" sz="4000" dirty="0"/>
@@ -16644,7 +15776,7 @@
               </a:lnSpc>
             </a:pPr>
             <a:r>
-              <a:rPr lang="en-US" dirty="0" smtClean="0">
+              <a:rPr lang="en-US" dirty="0">
                 <a:solidFill>
                   <a:schemeClr val="tx1">
                     <a:lumMod val="40000"/>
@@ -16670,7 +15802,7 @@
               </a:lnSpc>
             </a:pPr>
             <a:r>
-              <a:rPr lang="en-US" dirty="0" smtClean="0">
+              <a:rPr lang="en-US" dirty="0">
                 <a:solidFill>
                   <a:schemeClr val="tx1">
                     <a:lumMod val="40000"/>
@@ -16688,7 +15820,7 @@
               </a:lnSpc>
             </a:pPr>
             <a:r>
-              <a:rPr lang="en-US" dirty="0" smtClean="0"/>
+              <a:rPr lang="en-US" dirty="0"/>
               <a:t>There is no such thing as "just an object"</a:t>
             </a:r>
           </a:p>
@@ -16699,7 +15831,7 @@
               </a:lnSpc>
             </a:pPr>
             <a:r>
-              <a:rPr lang="en-US" dirty="0" smtClean="0"/>
+              <a:rPr lang="en-US" dirty="0"/>
               <a:t>it's either a block, a racket or something else</a:t>
             </a:r>
           </a:p>
@@ -16710,10 +15842,10 @@
               </a:lnSpc>
             </a:pPr>
             <a:r>
-              <a:rPr lang="en-US" dirty="0" smtClean="0"/>
+              <a:rPr lang="en-US" dirty="0"/>
               <a:t>Has a protected constructor</a:t>
             </a:r>
-            <a:endParaRPr lang="en-US" dirty="0" smtClean="0">
+            <a:endParaRPr lang="en-US" dirty="0">
               <a:solidFill>
                 <a:schemeClr val="tx1">
                   <a:lumMod val="40000"/>
@@ -16729,7 +15861,7 @@
               </a:lnSpc>
             </a:pPr>
             <a:r>
-              <a:rPr lang="en-US" dirty="0" smtClean="0">
+              <a:rPr lang="en-US" dirty="0">
                 <a:solidFill>
                   <a:schemeClr val="tx1">
                     <a:lumMod val="40000"/>
@@ -16740,7 +15872,7 @@
               <a:t>Implements the </a:t>
             </a:r>
             <a:r>
-              <a:rPr lang="en-US" dirty="0" err="1" smtClean="0">
+              <a:rPr lang="en-US" dirty="0" err="1">
                 <a:solidFill>
                   <a:schemeClr val="tx1">
                     <a:lumMod val="40000"/>
@@ -16751,7 +15883,7 @@
               <a:t>IRenderable</a:t>
             </a:r>
             <a:r>
-              <a:rPr lang="en-US" dirty="0" smtClean="0">
+              <a:rPr lang="en-US" dirty="0">
                 <a:solidFill>
                   <a:schemeClr val="tx1">
                     <a:lumMod val="40000"/>
@@ -16769,15 +15901,15 @@
               </a:lnSpc>
             </a:pPr>
             <a:r>
-              <a:rPr lang="en-US" dirty="0" smtClean="0"/>
+              <a:rPr lang="en-US" dirty="0"/>
               <a:t>Provides a </a:t>
             </a:r>
             <a:r>
-              <a:rPr lang="en-US" dirty="0" err="1" smtClean="0"/>
+              <a:rPr lang="en-US" dirty="0" err="1"/>
               <a:t>GetImage</a:t>
             </a:r>
             <a:r>
-              <a:rPr lang="en-US" dirty="0" smtClean="0"/>
+              <a:rPr lang="en-US" dirty="0"/>
               <a:t> method – returns a char matrix for visualization</a:t>
             </a:r>
           </a:p>
@@ -16788,7 +15920,7 @@
               </a:lnSpc>
             </a:pPr>
             <a:r>
-              <a:rPr lang="en-US" dirty="0" smtClean="0">
+              <a:rPr lang="en-US" dirty="0">
                 <a:solidFill>
                   <a:schemeClr val="tx1">
                     <a:lumMod val="40000"/>
@@ -16805,7 +15937,7 @@
                 <a:spcPct val="100000"/>
               </a:lnSpc>
             </a:pPr>
-            <a:endParaRPr lang="en-US" dirty="0" smtClean="0">
+            <a:endParaRPr lang="en-US" dirty="0">
               <a:solidFill>
                 <a:schemeClr val="tx1">
                   <a:lumMod val="40000"/>
@@ -16878,13 +16010,6 @@
     <a:masterClrMapping/>
   </p:clrMapOvr>
   <p:transition/>
-  <p:timing>
-    <p:tnLst>
-      <p:par>
-        <p:cTn id="1" dur="indefinite" restart="never" nodeType="tmRoot"/>
-      </p:par>
-    </p:tnLst>
-  </p:timing>
 </p:sld>
 </file>
 
@@ -16931,7 +16056,7 @@
               <a:defRPr/>
             </a:pPr>
             <a:r>
-              <a:rPr lang="en-US" sz="4000" dirty="0" smtClean="0"/>
+              <a:rPr lang="en-US" sz="4000" dirty="0"/>
               <a:t>The GameObject class (2)</a:t>
             </a:r>
             <a:endParaRPr lang="bg-BG" sz="4000" dirty="0"/>
@@ -16967,7 +16092,7 @@
               </a:lnSpc>
             </a:pPr>
             <a:r>
-              <a:rPr lang="en-US" dirty="0" smtClean="0">
+              <a:rPr lang="en-US" dirty="0">
                 <a:solidFill>
                   <a:schemeClr val="tx1">
                     <a:lumMod val="40000"/>
@@ -16978,7 +16103,7 @@
               <a:t>Implements the </a:t>
             </a:r>
             <a:r>
-              <a:rPr lang="en-US" dirty="0" err="1" smtClean="0">
+              <a:rPr lang="en-US" dirty="0" err="1">
                 <a:solidFill>
                   <a:schemeClr val="tx1">
                     <a:lumMod val="40000"/>
@@ -16989,7 +16114,7 @@
               <a:t>IObjectProducer</a:t>
             </a:r>
             <a:r>
-              <a:rPr lang="en-US" dirty="0" smtClean="0">
+              <a:rPr lang="en-US" dirty="0">
                 <a:solidFill>
                   <a:schemeClr val="tx1">
                     <a:lumMod val="40000"/>
@@ -17007,7 +16132,7 @@
               </a:lnSpc>
             </a:pPr>
             <a:r>
-              <a:rPr lang="en-US" dirty="0" smtClean="0">
+              <a:rPr lang="en-US" dirty="0">
                 <a:solidFill>
                   <a:schemeClr val="tx1">
                     <a:lumMod val="40000"/>
@@ -17025,7 +16150,7 @@
               </a:lnSpc>
             </a:pPr>
             <a:r>
-              <a:rPr lang="en-US" dirty="0" smtClean="0">
+              <a:rPr lang="en-US" dirty="0">
                 <a:solidFill>
                   <a:schemeClr val="tx1">
                     <a:lumMod val="40000"/>
@@ -17036,7 +16161,7 @@
               <a:t>Implements the </a:t>
             </a:r>
             <a:r>
-              <a:rPr lang="en-US" dirty="0" err="1" smtClean="0">
+              <a:rPr lang="en-US" dirty="0" err="1">
                 <a:solidFill>
                   <a:schemeClr val="tx1">
                     <a:lumMod val="40000"/>
@@ -17047,7 +16172,7 @@
               <a:t>ICollidable</a:t>
             </a:r>
             <a:r>
-              <a:rPr lang="en-US" dirty="0" smtClean="0">
+              <a:rPr lang="en-US" dirty="0">
                 <a:solidFill>
                   <a:schemeClr val="tx1">
                     <a:lumMod val="40000"/>
@@ -17065,7 +16190,7 @@
               </a:lnSpc>
             </a:pPr>
             <a:r>
-              <a:rPr lang="en-US" dirty="0" smtClean="0"/>
+              <a:rPr lang="en-US" dirty="0"/>
               <a:t>Enables objects to participate and respond to collisions</a:t>
             </a:r>
           </a:p>
@@ -17115,7 +16240,7 @@
                 <a:spcPct val="100000"/>
               </a:lnSpc>
             </a:pPr>
-            <a:endParaRPr lang="en-US" dirty="0" smtClean="0">
+            <a:endParaRPr lang="en-US" dirty="0">
               <a:solidFill>
                 <a:schemeClr val="tx1">
                   <a:lumMod val="40000"/>
@@ -17188,13 +16313,6 @@
     <a:masterClrMapping/>
   </p:clrMapOvr>
   <p:transition/>
-  <p:timing>
-    <p:tnLst>
-      <p:par>
-        <p:cTn id="1" dur="indefinite" restart="never" nodeType="tmRoot"/>
-      </p:par>
-    </p:tnLst>
-  </p:timing>
 </p:sld>
 </file>
 
@@ -17241,7 +16359,7 @@
               <a:defRPr/>
             </a:pPr>
             <a:r>
-              <a:rPr lang="en-US" sz="4000" dirty="0" smtClean="0"/>
+              <a:rPr lang="en-US" sz="4000" dirty="0"/>
               <a:t>The GameObject class (3)</a:t>
             </a:r>
             <a:endParaRPr lang="bg-BG" sz="4000" dirty="0"/>
@@ -17277,7 +16395,7 @@
               </a:lnSpc>
             </a:pPr>
             <a:r>
-              <a:rPr lang="en-US" dirty="0" smtClean="0">
+              <a:rPr lang="en-US" dirty="0">
                 <a:solidFill>
                   <a:schemeClr val="tx1">
                     <a:lumMod val="40000"/>
@@ -17285,18 +16403,7 @@
                   </a:schemeClr>
                 </a:solidFill>
               </a:rPr>
-              <a:t>Other </a:t>
-            </a:r>
-            <a:r>
-              <a:rPr lang="en-US" dirty="0">
-                <a:solidFill>
-                  <a:schemeClr val="tx1">
-                    <a:lumMod val="40000"/>
-                    <a:lumOff val="60000"/>
-                  </a:schemeClr>
-                </a:solidFill>
-              </a:rPr>
-              <a:t>fields</a:t>
+              <a:t>Other fields</a:t>
             </a:r>
           </a:p>
           <a:p>
@@ -17311,11 +16418,7 @@
             </a:r>
             <a:r>
               <a:rPr lang="en-US" dirty="0"/>
-              <a:t> – top left coordinates of the object in the </a:t>
-            </a:r>
-            <a:r>
-              <a:rPr lang="en-US" dirty="0" smtClean="0"/>
-              <a:t>world</a:t>
+              <a:t> – top left coordinates of the object in the world</a:t>
             </a:r>
           </a:p>
           <a:p>
@@ -17325,11 +16428,11 @@
               </a:lnSpc>
             </a:pPr>
             <a:r>
-              <a:rPr lang="en-US" dirty="0" smtClean="0"/>
+              <a:rPr lang="en-US" dirty="0"/>
               <a:t>Represented by instance of </a:t>
             </a:r>
             <a:r>
-              <a:rPr lang="en-US" dirty="0" err="1" smtClean="0"/>
+              <a:rPr lang="en-US" dirty="0" err="1"/>
               <a:t>MatrixCoords</a:t>
             </a:r>
             <a:endParaRPr lang="en-US" dirty="0"/>
@@ -17342,13 +16445,8 @@
             </a:pPr>
             <a:r>
               <a:rPr lang="en-US" dirty="0"/>
-              <a:t>body – defines the body of the object as a char </a:t>
-            </a:r>
-            <a:r>
-              <a:rPr lang="en-US" dirty="0" smtClean="0"/>
-              <a:t>matrix</a:t>
-            </a:r>
-            <a:endParaRPr lang="en-US" dirty="0"/>
+              <a:t>body – defines the body of the object as a char matrix</a:t>
+            </a:r>
           </a:p>
           <a:p>
             <a:pPr lvl="1">
@@ -17357,14 +16455,13 @@
               </a:lnSpc>
             </a:pPr>
             <a:r>
-              <a:rPr lang="en-US" dirty="0" err="1" smtClean="0"/>
+              <a:rPr lang="en-US" dirty="0" err="1"/>
               <a:t>IsDestroyed</a:t>
             </a:r>
             <a:r>
-              <a:rPr lang="en-US" dirty="0" smtClean="0"/>
+              <a:rPr lang="en-US" dirty="0"/>
               <a:t> – property indicating if the object should be removed from the world</a:t>
             </a:r>
-            <a:endParaRPr lang="en-US" dirty="0"/>
           </a:p>
         </p:txBody>
       </p:sp>
@@ -17430,13 +16527,6 @@
     <a:masterClrMapping/>
   </p:clrMapOvr>
   <p:transition/>
-  <p:timing>
-    <p:tnLst>
-      <p:par>
-        <p:cTn id="1" dur="indefinite" restart="never" nodeType="tmRoot"/>
-      </p:par>
-    </p:tnLst>
-  </p:timing>
 </p:sld>
 </file>
 

</xml_diff>